<commit_message>
Fix My Profile link - change from /profile to /settings/profile
</commit_message>
<xml_diff>
--- a/staff-training-slides.pptx
+++ b/staff-training-slides.pptx
@@ -2,8 +2,11 @@
 <file path=ppt/presentation.xml><?xml version="1.0" encoding="utf-8"?>
 <p:presentation xmlns:a="http://schemas.openxmlformats.org/drawingml/2006/main" xmlns:r="http://schemas.openxmlformats.org/officeDocument/2006/relationships" xmlns:p="http://schemas.openxmlformats.org/presentationml/2006/main" saveSubsetFonts="1" autoCompressPictures="0">
   <p:sldMasterIdLst>
-    <p:sldMasterId id="2147483648" r:id="rId1"/>
+    <p:sldMasterId id="2147483676" r:id="rId1"/>
   </p:sldMasterIdLst>
+  <p:notesMasterIdLst>
+    <p:notesMasterId r:id="rId35"/>
+  </p:notesMasterIdLst>
   <p:sldIdLst>
     <p:sldId id="256" r:id="rId2"/>
     <p:sldId id="257" r:id="rId3"/>
@@ -39,12 +42,12 @@
     <p:sldId id="287" r:id="rId33"/>
     <p:sldId id="288" r:id="rId34"/>
   </p:sldIdLst>
-  <p:notesMasterIdLst>
-    <p:notesMasterId r:id="rId35"/>
-  </p:notesMasterIdLst>
   <p:sldSz cx="12192000" cy="6858000"/>
   <p:notesSz cx="6858000" cy="12192000"/>
   <p:defaultTextStyle>
+    <a:defPPr>
+      <a:defRPr lang="en-US"/>
+    </a:defPPr>
     <a:lvl1pPr marL="0" algn="l" defTabSz="914400" rtl="0" eaLnBrk="1" latinLnBrk="0" hangingPunct="1">
       <a:defRPr sz="1800" kern="1200">
         <a:solidFill>
@@ -136,6 +139,11 @@
       </a:defRPr>
     </a:lvl9pPr>
   </p:defaultTextStyle>
+  <p:extLst>
+    <p:ext uri="{EFAFB233-063F-42B5-8137-9DF3F51BA10A}">
+      <p15:sldGuideLst xmlns:p15="http://schemas.microsoft.com/office/powerpoint/2012/main"/>
+    </p:ext>
+  </p:extLst>
 </p:presentation>
 </file>
 
@@ -161,234 +169,10 @@
           <a:chExt cx="0" cy="0"/>
         </a:xfrm>
       </p:grpSpPr>
-      <p:sp>
-        <p:nvSpPr>
-          <p:cNvPr id="2" name="Header Placeholder 1"/>
-          <p:cNvSpPr>
-            <a:spLocks noGrp="1"/>
-          </p:cNvSpPr>
-          <p:nvPr>
-            <p:ph type="hdr" sz="quarter"/>
-          </p:nvPr>
-        </p:nvSpPr>
-        <p:spPr>
-          <a:xfrm>
-            <a:off x="0" y="0"/>
-            <a:ext cx="2971800" cy="458788"/>
-          </a:xfrm>
-          <a:prstGeom prst="rect">
-            <a:avLst/>
-          </a:prstGeom>
-        </p:spPr>
-        <p:txBody>
-          <a:bodyPr vert="horz" lIns="91440" tIns="45720" rIns="91440" bIns="45720" rtlCol="0"/>
-          <a:lstStyle>
-            <a:lvl1pPr algn="l">
-              <a:defRPr sz="1200"/>
-            </a:lvl1pPr>
-          </a:lstStyle>
-          <a:p>
-            <a:endParaRPr lang="en-US"/>
-          </a:p>
-        </p:txBody>
-      </p:sp>
-      <p:sp>
-        <p:nvSpPr>
-          <p:cNvPr id="3" name="Date Placeholder 2"/>
-          <p:cNvSpPr>
-            <a:spLocks noGrp="1"/>
-          </p:cNvSpPr>
-          <p:nvPr>
-            <p:ph type="dt" idx="1"/>
-          </p:nvPr>
-        </p:nvSpPr>
-        <p:spPr>
-          <a:xfrm>
-            <a:off x="3884613" y="0"/>
-            <a:ext cx="2971800" cy="458788"/>
-          </a:xfrm>
-          <a:prstGeom prst="rect">
-            <a:avLst/>
-          </a:prstGeom>
-        </p:spPr>
-        <p:txBody>
-          <a:bodyPr vert="horz" lIns="91440" tIns="45720" rIns="91440" bIns="45720" rtlCol="0"/>
-          <a:lstStyle>
-            <a:lvl1pPr algn="r">
-              <a:defRPr sz="1200"/>
-            </a:lvl1pPr>
-          </a:lstStyle>
-          <a:p>
-            <a:fld id="{5282F153-3F37-0F45-9E97-73ACFA13230C}" type="datetimeFigureOut">
-              <a:rPr lang="en-US"/>
-              <a:t>7/23/19</a:t>
-            </a:fld>
-            <a:endParaRPr lang="en-US"/>
-          </a:p>
-        </p:txBody>
-      </p:sp>
-      <p:sp>
-        <p:nvSpPr>
-          <p:cNvPr id="4" name="Slide Image Placeholder 3"/>
-          <p:cNvSpPr>
-            <a:spLocks noGrp="1" noRot="1" noChangeAspect="1"/>
-          </p:cNvSpPr>
-          <p:nvPr>
-            <p:ph type="sldImg" idx="2"/>
-          </p:nvPr>
-        </p:nvSpPr>
-        <p:spPr>
-          <a:xfrm>
-            <a:off x="685800" y="1143000"/>
-            <a:ext cx="5486400" cy="3086100"/>
-          </a:xfrm>
-          <a:prstGeom prst="rect">
-            <a:avLst/>
-          </a:prstGeom>
-          <a:noFill/>
-          <a:ln w="12700">
-            <a:solidFill>
-              <a:prstClr val="black"/>
-            </a:solidFill>
-          </a:ln>
-        </p:spPr>
-        <p:txBody>
-          <a:bodyPr vert="horz" lIns="91440" tIns="45720" rIns="91440" bIns="45720" rtlCol="0" anchor="ctr"/>
-          <a:lstStyle/>
-          <a:p>
-            <a:endParaRPr lang="en-US"/>
-          </a:p>
-        </p:txBody>
-      </p:sp>
-      <p:sp>
-        <p:nvSpPr>
-          <p:cNvPr id="5" name="Notes Placeholder 4"/>
-          <p:cNvSpPr>
-            <a:spLocks noGrp="1"/>
-          </p:cNvSpPr>
-          <p:nvPr>
-            <p:ph type="body" sz="quarter" idx="3"/>
-          </p:nvPr>
-        </p:nvSpPr>
-        <p:spPr>
-          <a:xfrm>
-            <a:off x="685800" y="4400550"/>
-            <a:ext cx="5486400" cy="3600450"/>
-          </a:xfrm>
-          <a:prstGeom prst="rect">
-            <a:avLst/>
-          </a:prstGeom>
-        </p:spPr>
-        <p:txBody>
-          <a:bodyPr vert="horz" lIns="91440" tIns="45720" rIns="91440" bIns="45720" rtlCol="0"/>
-          <a:lstStyle/>
-          <a:p>
-            <a:pPr lvl="0"/>
-            <a:r>
-              <a:rPr lang="en-US"/>
-              <a:t>Click to edit Master text styles</a:t>
-            </a:r>
-          </a:p>
-          <a:p>
-            <a:pPr lvl="1"/>
-            <a:r>
-              <a:rPr lang="en-US"/>
-              <a:t>Second level</a:t>
-            </a:r>
-          </a:p>
-          <a:p>
-            <a:pPr lvl="2"/>
-            <a:r>
-              <a:rPr lang="en-US"/>
-              <a:t>Third level</a:t>
-            </a:r>
-          </a:p>
-          <a:p>
-            <a:pPr lvl="3"/>
-            <a:r>
-              <a:rPr lang="en-US"/>
-              <a:t>Fourth level</a:t>
-            </a:r>
-          </a:p>
-          <a:p>
-            <a:pPr lvl="4"/>
-            <a:r>
-              <a:rPr lang="en-US"/>
-              <a:t>Fifth level</a:t>
-            </a:r>
-          </a:p>
-        </p:txBody>
-      </p:sp>
-      <p:sp>
-        <p:nvSpPr>
-          <p:cNvPr id="6" name="Footer Placeholder 5"/>
-          <p:cNvSpPr>
-            <a:spLocks noGrp="1"/>
-          </p:cNvSpPr>
-          <p:nvPr>
-            <p:ph type="ftr" sz="quarter" idx="4"/>
-          </p:nvPr>
-        </p:nvSpPr>
-        <p:spPr>
-          <a:xfrm>
-            <a:off x="0" y="8685213"/>
-            <a:ext cx="2971800" cy="458787"/>
-          </a:xfrm>
-          <a:prstGeom prst="rect">
-            <a:avLst/>
-          </a:prstGeom>
-        </p:spPr>
-        <p:txBody>
-          <a:bodyPr vert="horz" lIns="91440" tIns="45720" rIns="91440" bIns="45720" rtlCol="0" anchor="b"/>
-          <a:lstStyle>
-            <a:lvl1pPr algn="l">
-              <a:defRPr sz="1200"/>
-            </a:lvl1pPr>
-          </a:lstStyle>
-          <a:p>
-            <a:endParaRPr lang="en-US"/>
-          </a:p>
-        </p:txBody>
-      </p:sp>
-      <p:sp>
-        <p:nvSpPr>
-          <p:cNvPr id="7" name="Slide Number Placeholder 6"/>
-          <p:cNvSpPr>
-            <a:spLocks noGrp="1"/>
-          </p:cNvSpPr>
-          <p:nvPr>
-            <p:ph type="sldNum" sz="quarter" idx="5"/>
-          </p:nvPr>
-        </p:nvSpPr>
-        <p:spPr>
-          <a:xfrm>
-            <a:off x="3884613" y="8685213"/>
-            <a:ext cx="2971800" cy="458787"/>
-          </a:xfrm>
-          <a:prstGeom prst="rect">
-            <a:avLst/>
-          </a:prstGeom>
-        </p:spPr>
-        <p:txBody>
-          <a:bodyPr vert="horz" lIns="91440" tIns="45720" rIns="91440" bIns="45720" rtlCol="0" anchor="b"/>
-          <a:lstStyle>
-            <a:lvl1pPr algn="r">
-              <a:defRPr sz="1200"/>
-            </a:lvl1pPr>
-          </a:lstStyle>
-          <a:p>
-            <a:fld id="{CE5E9CC1-C706-0F49-92D6-E571CC5EEA8F}" type="slidenum">
-              <a:rPr lang="en-US"/>
-              <a:t>‹#›</a:t>
-            </a:fld>
-            <a:endParaRPr lang="en-US"/>
-          </a:p>
-        </p:txBody>
-      </p:sp>
     </p:spTree>
     <p:extLst>
       <p:ext uri="{BB962C8B-B14F-4D97-AF65-F5344CB8AC3E}">
-        <p14:creationId xmlns:p14="http://schemas.microsoft.com/office/powerpoint/2010/main" val="1024086991"/>
+        <p14:creationId xmlns:p14="http://schemas.microsoft.com/office/powerpoint/2010/main" val="393611575"/>
       </p:ext>
     </p:extLst>
   </p:cSld>
@@ -532,10 +316,6 @@
           <a:bodyPr/>
           <a:lstStyle/>
           <a:p>
-            <a:r>
-              <a:rPr lang="en-US" dirty="0"/>
-              <a:t/>
-            </a:r>
             <a:endParaRPr lang="en-US" dirty="0"/>
           </a:p>
         </p:txBody>
@@ -620,10 +400,6 @@
           <a:bodyPr/>
           <a:lstStyle/>
           <a:p>
-            <a:r>
-              <a:rPr lang="en-US" dirty="0"/>
-              <a:t/>
-            </a:r>
             <a:endParaRPr lang="en-US" dirty="0"/>
           </a:p>
         </p:txBody>
@@ -708,10 +484,6 @@
           <a:bodyPr/>
           <a:lstStyle/>
           <a:p>
-            <a:r>
-              <a:rPr lang="en-US" dirty="0"/>
-              <a:t/>
-            </a:r>
             <a:endParaRPr lang="en-US" dirty="0"/>
           </a:p>
         </p:txBody>
@@ -796,10 +568,6 @@
           <a:bodyPr/>
           <a:lstStyle/>
           <a:p>
-            <a:r>
-              <a:rPr lang="en-US" dirty="0"/>
-              <a:t/>
-            </a:r>
             <a:endParaRPr lang="en-US" dirty="0"/>
           </a:p>
         </p:txBody>
@@ -884,10 +652,6 @@
           <a:bodyPr/>
           <a:lstStyle/>
           <a:p>
-            <a:r>
-              <a:rPr lang="en-US" dirty="0"/>
-              <a:t/>
-            </a:r>
             <a:endParaRPr lang="en-US" dirty="0"/>
           </a:p>
         </p:txBody>
@@ -972,10 +736,6 @@
           <a:bodyPr/>
           <a:lstStyle/>
           <a:p>
-            <a:r>
-              <a:rPr lang="en-US" dirty="0"/>
-              <a:t/>
-            </a:r>
             <a:endParaRPr lang="en-US" dirty="0"/>
           </a:p>
         </p:txBody>
@@ -1060,10 +820,6 @@
           <a:bodyPr/>
           <a:lstStyle/>
           <a:p>
-            <a:r>
-              <a:rPr lang="en-US" dirty="0"/>
-              <a:t/>
-            </a:r>
             <a:endParaRPr lang="en-US" dirty="0"/>
           </a:p>
         </p:txBody>
@@ -1148,10 +904,6 @@
           <a:bodyPr/>
           <a:lstStyle/>
           <a:p>
-            <a:r>
-              <a:rPr lang="en-US" dirty="0"/>
-              <a:t/>
-            </a:r>
             <a:endParaRPr lang="en-US" dirty="0"/>
           </a:p>
         </p:txBody>
@@ -1236,10 +988,6 @@
           <a:bodyPr/>
           <a:lstStyle/>
           <a:p>
-            <a:r>
-              <a:rPr lang="en-US" dirty="0"/>
-              <a:t/>
-            </a:r>
             <a:endParaRPr lang="en-US" dirty="0"/>
           </a:p>
         </p:txBody>
@@ -1324,10 +1072,6 @@
           <a:bodyPr/>
           <a:lstStyle/>
           <a:p>
-            <a:r>
-              <a:rPr lang="en-US" dirty="0"/>
-              <a:t/>
-            </a:r>
             <a:endParaRPr lang="en-US" dirty="0"/>
           </a:p>
         </p:txBody>
@@ -1412,10 +1156,6 @@
           <a:bodyPr/>
           <a:lstStyle/>
           <a:p>
-            <a:r>
-              <a:rPr lang="en-US" dirty="0"/>
-              <a:t/>
-            </a:r>
             <a:endParaRPr lang="en-US" dirty="0"/>
           </a:p>
         </p:txBody>
@@ -1500,10 +1240,6 @@
           <a:bodyPr/>
           <a:lstStyle/>
           <a:p>
-            <a:r>
-              <a:rPr lang="en-US" dirty="0"/>
-              <a:t/>
-            </a:r>
             <a:endParaRPr lang="en-US" dirty="0"/>
           </a:p>
         </p:txBody>
@@ -1588,10 +1324,6 @@
           <a:bodyPr/>
           <a:lstStyle/>
           <a:p>
-            <a:r>
-              <a:rPr lang="en-US" dirty="0"/>
-              <a:t/>
-            </a:r>
             <a:endParaRPr lang="en-US" dirty="0"/>
           </a:p>
         </p:txBody>
@@ -1676,10 +1408,6 @@
           <a:bodyPr/>
           <a:lstStyle/>
           <a:p>
-            <a:r>
-              <a:rPr lang="en-US" dirty="0"/>
-              <a:t/>
-            </a:r>
             <a:endParaRPr lang="en-US" dirty="0"/>
           </a:p>
         </p:txBody>
@@ -1764,10 +1492,6 @@
           <a:bodyPr/>
           <a:lstStyle/>
           <a:p>
-            <a:r>
-              <a:rPr lang="en-US" dirty="0"/>
-              <a:t/>
-            </a:r>
             <a:endParaRPr lang="en-US" dirty="0"/>
           </a:p>
         </p:txBody>
@@ -1852,10 +1576,6 @@
           <a:bodyPr/>
           <a:lstStyle/>
           <a:p>
-            <a:r>
-              <a:rPr lang="en-US" dirty="0"/>
-              <a:t/>
-            </a:r>
             <a:endParaRPr lang="en-US" dirty="0"/>
           </a:p>
         </p:txBody>
@@ -1940,10 +1660,6 @@
           <a:bodyPr/>
           <a:lstStyle/>
           <a:p>
-            <a:r>
-              <a:rPr lang="en-US" dirty="0"/>
-              <a:t/>
-            </a:r>
             <a:endParaRPr lang="en-US" dirty="0"/>
           </a:p>
         </p:txBody>
@@ -2028,10 +1744,6 @@
           <a:bodyPr/>
           <a:lstStyle/>
           <a:p>
-            <a:r>
-              <a:rPr lang="en-US" dirty="0"/>
-              <a:t/>
-            </a:r>
             <a:endParaRPr lang="en-US" dirty="0"/>
           </a:p>
         </p:txBody>
@@ -2116,10 +1828,6 @@
           <a:bodyPr/>
           <a:lstStyle/>
           <a:p>
-            <a:r>
-              <a:rPr lang="en-US" dirty="0"/>
-              <a:t/>
-            </a:r>
             <a:endParaRPr lang="en-US" dirty="0"/>
           </a:p>
         </p:txBody>
@@ -2204,10 +1912,6 @@
           <a:bodyPr/>
           <a:lstStyle/>
           <a:p>
-            <a:r>
-              <a:rPr lang="en-US" dirty="0"/>
-              <a:t/>
-            </a:r>
             <a:endParaRPr lang="en-US" dirty="0"/>
           </a:p>
         </p:txBody>
@@ -2292,10 +1996,6 @@
           <a:bodyPr/>
           <a:lstStyle/>
           <a:p>
-            <a:r>
-              <a:rPr lang="en-US" dirty="0"/>
-              <a:t/>
-            </a:r>
             <a:endParaRPr lang="en-US" dirty="0"/>
           </a:p>
         </p:txBody>
@@ -2380,10 +2080,6 @@
           <a:bodyPr/>
           <a:lstStyle/>
           <a:p>
-            <a:r>
-              <a:rPr lang="en-US" dirty="0"/>
-              <a:t/>
-            </a:r>
             <a:endParaRPr lang="en-US" dirty="0"/>
           </a:p>
         </p:txBody>
@@ -2468,10 +2164,6 @@
           <a:bodyPr/>
           <a:lstStyle/>
           <a:p>
-            <a:r>
-              <a:rPr lang="en-US" dirty="0"/>
-              <a:t/>
-            </a:r>
             <a:endParaRPr lang="en-US" dirty="0"/>
           </a:p>
         </p:txBody>
@@ -2556,10 +2248,6 @@
           <a:bodyPr/>
           <a:lstStyle/>
           <a:p>
-            <a:r>
-              <a:rPr lang="en-US" dirty="0"/>
-              <a:t/>
-            </a:r>
             <a:endParaRPr lang="en-US" dirty="0"/>
           </a:p>
         </p:txBody>
@@ -2644,10 +2332,6 @@
           <a:bodyPr/>
           <a:lstStyle/>
           <a:p>
-            <a:r>
-              <a:rPr lang="en-US" dirty="0"/>
-              <a:t/>
-            </a:r>
             <a:endParaRPr lang="en-US" dirty="0"/>
           </a:p>
         </p:txBody>
@@ -2732,10 +2416,6 @@
           <a:bodyPr/>
           <a:lstStyle/>
           <a:p>
-            <a:r>
-              <a:rPr lang="en-US" dirty="0"/>
-              <a:t/>
-            </a:r>
             <a:endParaRPr lang="en-US" dirty="0"/>
           </a:p>
         </p:txBody>
@@ -2820,10 +2500,6 @@
           <a:bodyPr/>
           <a:lstStyle/>
           <a:p>
-            <a:r>
-              <a:rPr lang="en-US" dirty="0"/>
-              <a:t/>
-            </a:r>
             <a:endParaRPr lang="en-US" dirty="0"/>
           </a:p>
         </p:txBody>
@@ -2908,10 +2584,6 @@
           <a:bodyPr/>
           <a:lstStyle/>
           <a:p>
-            <a:r>
-              <a:rPr lang="en-US" dirty="0"/>
-              <a:t/>
-            </a:r>
             <a:endParaRPr lang="en-US" dirty="0"/>
           </a:p>
         </p:txBody>
@@ -2996,10 +2668,6 @@
           <a:bodyPr/>
           <a:lstStyle/>
           <a:p>
-            <a:r>
-              <a:rPr lang="en-US" dirty="0"/>
-              <a:t/>
-            </a:r>
             <a:endParaRPr lang="en-US" dirty="0"/>
           </a:p>
         </p:txBody>
@@ -3084,10 +2752,6 @@
           <a:bodyPr/>
           <a:lstStyle/>
           <a:p>
-            <a:r>
-              <a:rPr lang="en-US" dirty="0"/>
-              <a:t/>
-            </a:r>
             <a:endParaRPr lang="en-US" dirty="0"/>
           </a:p>
         </p:txBody>
@@ -3172,10 +2836,6 @@
           <a:bodyPr/>
           <a:lstStyle/>
           <a:p>
-            <a:r>
-              <a:rPr lang="en-US" dirty="0"/>
-              <a:t/>
-            </a:r>
             <a:endParaRPr lang="en-US" dirty="0"/>
           </a:p>
         </p:txBody>
@@ -3260,10 +2920,6 @@
           <a:bodyPr/>
           <a:lstStyle/>
           <a:p>
-            <a:r>
-              <a:rPr lang="en-US" dirty="0"/>
-              <a:t/>
-            </a:r>
             <a:endParaRPr lang="en-US" dirty="0"/>
           </a:p>
         </p:txBody>
@@ -3348,10 +3004,6 @@
           <a:bodyPr/>
           <a:lstStyle/>
           <a:p>
-            <a:r>
-              <a:rPr lang="en-US" dirty="0"/>
-              <a:t/>
-            </a:r>
             <a:endParaRPr lang="en-US" dirty="0"/>
           </a:p>
         </p:txBody>
@@ -3393,7 +3045,636 @@
 </file>
 
 <file path=ppt/slideLayouts/slideLayout1.xml><?xml version="1.0" encoding="utf-8"?>
-<p:sldLayout xmlns:a="http://schemas.openxmlformats.org/drawingml/2006/main" xmlns:r="http://schemas.openxmlformats.org/officeDocument/2006/relationships" xmlns:p="http://schemas.openxmlformats.org/presentationml/2006/main" preserve="1">
+<p:sldLayout xmlns:a="http://schemas.openxmlformats.org/drawingml/2006/main" xmlns:r="http://schemas.openxmlformats.org/officeDocument/2006/relationships" xmlns:p="http://schemas.openxmlformats.org/presentationml/2006/main" type="title" preserve="1">
+  <p:cSld name="Title Slide">
+    <p:spTree>
+      <p:nvGrpSpPr>
+        <p:cNvPr id="1" name=""/>
+        <p:cNvGrpSpPr/>
+        <p:nvPr/>
+      </p:nvGrpSpPr>
+      <p:grpSpPr>
+        <a:xfrm>
+          <a:off x="0" y="0"/>
+          <a:ext cx="0" cy="0"/>
+          <a:chOff x="0" y="0"/>
+          <a:chExt cx="0" cy="0"/>
+        </a:xfrm>
+      </p:grpSpPr>
+      <p:sp>
+        <p:nvSpPr>
+          <p:cNvPr id="2" name="Title 1">
+            <a:extLst>
+              <a:ext uri="{FF2B5EF4-FFF2-40B4-BE49-F238E27FC236}">
+                <a16:creationId xmlns:a16="http://schemas.microsoft.com/office/drawing/2014/main" id="{B7D47B35-A78D-F8CC-3431-7F43B56CB6AA}"/>
+              </a:ext>
+            </a:extLst>
+          </p:cNvPr>
+          <p:cNvSpPr>
+            <a:spLocks noGrp="1"/>
+          </p:cNvSpPr>
+          <p:nvPr>
+            <p:ph type="ctrTitle"/>
+          </p:nvPr>
+        </p:nvSpPr>
+        <p:spPr>
+          <a:xfrm>
+            <a:off x="1524000" y="1122363"/>
+            <a:ext cx="9144000" cy="2387600"/>
+          </a:xfrm>
+        </p:spPr>
+        <p:txBody>
+          <a:bodyPr anchor="b"/>
+          <a:lstStyle>
+            <a:lvl1pPr algn="ctr">
+              <a:defRPr sz="6000"/>
+            </a:lvl1pPr>
+          </a:lstStyle>
+          <a:p>
+            <a:r>
+              <a:rPr lang="en-US"/>
+              <a:t>Click to edit Master title style</a:t>
+            </a:r>
+          </a:p>
+        </p:txBody>
+      </p:sp>
+      <p:sp>
+        <p:nvSpPr>
+          <p:cNvPr id="3" name="Subtitle 2">
+            <a:extLst>
+              <a:ext uri="{FF2B5EF4-FFF2-40B4-BE49-F238E27FC236}">
+                <a16:creationId xmlns:a16="http://schemas.microsoft.com/office/drawing/2014/main" id="{C491E8FA-AC69-F1F4-846C-0600930A0A1F}"/>
+              </a:ext>
+            </a:extLst>
+          </p:cNvPr>
+          <p:cNvSpPr>
+            <a:spLocks noGrp="1"/>
+          </p:cNvSpPr>
+          <p:nvPr>
+            <p:ph type="subTitle" idx="1"/>
+          </p:nvPr>
+        </p:nvSpPr>
+        <p:spPr>
+          <a:xfrm>
+            <a:off x="1524000" y="3602038"/>
+            <a:ext cx="9144000" cy="1655762"/>
+          </a:xfrm>
+        </p:spPr>
+        <p:txBody>
+          <a:bodyPr/>
+          <a:lstStyle>
+            <a:lvl1pPr marL="0" indent="0" algn="ctr">
+              <a:buNone/>
+              <a:defRPr sz="2400"/>
+            </a:lvl1pPr>
+            <a:lvl2pPr marL="457200" indent="0" algn="ctr">
+              <a:buNone/>
+              <a:defRPr sz="2000"/>
+            </a:lvl2pPr>
+            <a:lvl3pPr marL="914400" indent="0" algn="ctr">
+              <a:buNone/>
+              <a:defRPr sz="1800"/>
+            </a:lvl3pPr>
+            <a:lvl4pPr marL="1371600" indent="0" algn="ctr">
+              <a:buNone/>
+              <a:defRPr sz="1600"/>
+            </a:lvl4pPr>
+            <a:lvl5pPr marL="1828800" indent="0" algn="ctr">
+              <a:buNone/>
+              <a:defRPr sz="1600"/>
+            </a:lvl5pPr>
+            <a:lvl6pPr marL="2286000" indent="0" algn="ctr">
+              <a:buNone/>
+              <a:defRPr sz="1600"/>
+            </a:lvl6pPr>
+            <a:lvl7pPr marL="2743200" indent="0" algn="ctr">
+              <a:buNone/>
+              <a:defRPr sz="1600"/>
+            </a:lvl7pPr>
+            <a:lvl8pPr marL="3200400" indent="0" algn="ctr">
+              <a:buNone/>
+              <a:defRPr sz="1600"/>
+            </a:lvl8pPr>
+            <a:lvl9pPr marL="3657600" indent="0" algn="ctr">
+              <a:buNone/>
+              <a:defRPr sz="1600"/>
+            </a:lvl9pPr>
+          </a:lstStyle>
+          <a:p>
+            <a:r>
+              <a:rPr lang="en-US"/>
+              <a:t>Click to edit Master subtitle style</a:t>
+            </a:r>
+          </a:p>
+        </p:txBody>
+      </p:sp>
+      <p:sp>
+        <p:nvSpPr>
+          <p:cNvPr id="4" name="Date Placeholder 3">
+            <a:extLst>
+              <a:ext uri="{FF2B5EF4-FFF2-40B4-BE49-F238E27FC236}">
+                <a16:creationId xmlns:a16="http://schemas.microsoft.com/office/drawing/2014/main" id="{40C98AFF-C4AB-C941-2A1D-14B099267211}"/>
+              </a:ext>
+            </a:extLst>
+          </p:cNvPr>
+          <p:cNvSpPr>
+            <a:spLocks noGrp="1"/>
+          </p:cNvSpPr>
+          <p:nvPr>
+            <p:ph type="dt" sz="half" idx="10"/>
+          </p:nvPr>
+        </p:nvSpPr>
+        <p:spPr/>
+        <p:txBody>
+          <a:bodyPr/>
+          <a:lstStyle/>
+          <a:p>
+            <a:fld id="{C764DE79-268F-4C1A-8933-263129D2AF90}" type="datetimeFigureOut">
+              <a:rPr lang="en-US" smtClean="0"/>
+              <a:t>12/30/2025</a:t>
+            </a:fld>
+            <a:endParaRPr lang="en-US" dirty="0"/>
+          </a:p>
+        </p:txBody>
+      </p:sp>
+      <p:sp>
+        <p:nvSpPr>
+          <p:cNvPr id="5" name="Footer Placeholder 4">
+            <a:extLst>
+              <a:ext uri="{FF2B5EF4-FFF2-40B4-BE49-F238E27FC236}">
+                <a16:creationId xmlns:a16="http://schemas.microsoft.com/office/drawing/2014/main" id="{5FDA756D-8D17-4B7D-9888-3327D4958EFD}"/>
+              </a:ext>
+            </a:extLst>
+          </p:cNvPr>
+          <p:cNvSpPr>
+            <a:spLocks noGrp="1"/>
+          </p:cNvSpPr>
+          <p:nvPr>
+            <p:ph type="ftr" sz="quarter" idx="11"/>
+          </p:nvPr>
+        </p:nvSpPr>
+        <p:spPr/>
+        <p:txBody>
+          <a:bodyPr/>
+          <a:lstStyle/>
+          <a:p>
+            <a:endParaRPr lang="en-US" dirty="0"/>
+          </a:p>
+        </p:txBody>
+      </p:sp>
+      <p:sp>
+        <p:nvSpPr>
+          <p:cNvPr id="6" name="Slide Number Placeholder 5">
+            <a:extLst>
+              <a:ext uri="{FF2B5EF4-FFF2-40B4-BE49-F238E27FC236}">
+                <a16:creationId xmlns:a16="http://schemas.microsoft.com/office/drawing/2014/main" id="{C6C987E0-DF15-4107-D83A-C92D45C35310}"/>
+              </a:ext>
+            </a:extLst>
+          </p:cNvPr>
+          <p:cNvSpPr>
+            <a:spLocks noGrp="1"/>
+          </p:cNvSpPr>
+          <p:nvPr>
+            <p:ph type="sldNum" sz="quarter" idx="12"/>
+          </p:nvPr>
+        </p:nvSpPr>
+        <p:spPr/>
+        <p:txBody>
+          <a:bodyPr/>
+          <a:lstStyle/>
+          <a:p>
+            <a:fld id="{48F63A3B-78C7-47BE-AE5E-E10140E04643}" type="slidenum">
+              <a:rPr lang="en-US" smtClean="0"/>
+              <a:t>‹#›</a:t>
+            </a:fld>
+            <a:endParaRPr lang="en-US" dirty="0"/>
+          </a:p>
+        </p:txBody>
+      </p:sp>
+    </p:spTree>
+    <p:extLst>
+      <p:ext uri="{BB962C8B-B14F-4D97-AF65-F5344CB8AC3E}">
+        <p14:creationId xmlns:p14="http://schemas.microsoft.com/office/powerpoint/2010/main" val="373988033"/>
+      </p:ext>
+    </p:extLst>
+  </p:cSld>
+  <p:clrMapOvr>
+    <a:masterClrMapping/>
+  </p:clrMapOvr>
+  <p:hf sldNum="0" hdr="0" ftr="0" dt="0"/>
+</p:sldLayout>
+</file>
+
+<file path=ppt/slideLayouts/slideLayout10.xml><?xml version="1.0" encoding="utf-8"?>
+<p:sldLayout xmlns:a="http://schemas.openxmlformats.org/drawingml/2006/main" xmlns:r="http://schemas.openxmlformats.org/officeDocument/2006/relationships" xmlns:p="http://schemas.openxmlformats.org/presentationml/2006/main" type="vertTx" preserve="1">
+  <p:cSld name="Title and Vertical Text">
+    <p:spTree>
+      <p:nvGrpSpPr>
+        <p:cNvPr id="1" name=""/>
+        <p:cNvGrpSpPr/>
+        <p:nvPr/>
+      </p:nvGrpSpPr>
+      <p:grpSpPr>
+        <a:xfrm>
+          <a:off x="0" y="0"/>
+          <a:ext cx="0" cy="0"/>
+          <a:chOff x="0" y="0"/>
+          <a:chExt cx="0" cy="0"/>
+        </a:xfrm>
+      </p:grpSpPr>
+      <p:sp>
+        <p:nvSpPr>
+          <p:cNvPr id="2" name="Title 1">
+            <a:extLst>
+              <a:ext uri="{FF2B5EF4-FFF2-40B4-BE49-F238E27FC236}">
+                <a16:creationId xmlns:a16="http://schemas.microsoft.com/office/drawing/2014/main" id="{8E1E14ED-6C2C-5E32-175C-6AC52F71E229}"/>
+              </a:ext>
+            </a:extLst>
+          </p:cNvPr>
+          <p:cNvSpPr>
+            <a:spLocks noGrp="1"/>
+          </p:cNvSpPr>
+          <p:nvPr>
+            <p:ph type="title"/>
+          </p:nvPr>
+        </p:nvSpPr>
+        <p:spPr/>
+        <p:txBody>
+          <a:bodyPr/>
+          <a:lstStyle/>
+          <a:p>
+            <a:r>
+              <a:rPr lang="en-US"/>
+              <a:t>Click to edit Master title style</a:t>
+            </a:r>
+          </a:p>
+        </p:txBody>
+      </p:sp>
+      <p:sp>
+        <p:nvSpPr>
+          <p:cNvPr id="3" name="Vertical Text Placeholder 2">
+            <a:extLst>
+              <a:ext uri="{FF2B5EF4-FFF2-40B4-BE49-F238E27FC236}">
+                <a16:creationId xmlns:a16="http://schemas.microsoft.com/office/drawing/2014/main" id="{AD7660DF-8590-48F2-24C2-ED7DD86DD735}"/>
+              </a:ext>
+            </a:extLst>
+          </p:cNvPr>
+          <p:cNvSpPr>
+            <a:spLocks noGrp="1"/>
+          </p:cNvSpPr>
+          <p:nvPr>
+            <p:ph type="body" orient="vert" idx="1"/>
+          </p:nvPr>
+        </p:nvSpPr>
+        <p:spPr/>
+        <p:txBody>
+          <a:bodyPr vert="eaVert"/>
+          <a:lstStyle/>
+          <a:p>
+            <a:pPr lvl="0"/>
+            <a:r>
+              <a:rPr lang="en-US"/>
+              <a:t>Click to edit Master text styles</a:t>
+            </a:r>
+          </a:p>
+          <a:p>
+            <a:pPr lvl="1"/>
+            <a:r>
+              <a:rPr lang="en-US"/>
+              <a:t>Second level</a:t>
+            </a:r>
+          </a:p>
+          <a:p>
+            <a:pPr lvl="2"/>
+            <a:r>
+              <a:rPr lang="en-US"/>
+              <a:t>Third level</a:t>
+            </a:r>
+          </a:p>
+          <a:p>
+            <a:pPr lvl="3"/>
+            <a:r>
+              <a:rPr lang="en-US"/>
+              <a:t>Fourth level</a:t>
+            </a:r>
+          </a:p>
+          <a:p>
+            <a:pPr lvl="4"/>
+            <a:r>
+              <a:rPr lang="en-US"/>
+              <a:t>Fifth level</a:t>
+            </a:r>
+          </a:p>
+        </p:txBody>
+      </p:sp>
+      <p:sp>
+        <p:nvSpPr>
+          <p:cNvPr id="4" name="Date Placeholder 3">
+            <a:extLst>
+              <a:ext uri="{FF2B5EF4-FFF2-40B4-BE49-F238E27FC236}">
+                <a16:creationId xmlns:a16="http://schemas.microsoft.com/office/drawing/2014/main" id="{DDFB4868-3362-415A-A037-32A2811D43ED}"/>
+              </a:ext>
+            </a:extLst>
+          </p:cNvPr>
+          <p:cNvSpPr>
+            <a:spLocks noGrp="1"/>
+          </p:cNvSpPr>
+          <p:nvPr>
+            <p:ph type="dt" sz="half" idx="10"/>
+          </p:nvPr>
+        </p:nvSpPr>
+        <p:spPr/>
+        <p:txBody>
+          <a:bodyPr/>
+          <a:lstStyle/>
+          <a:p>
+            <a:fld id="{C764DE79-268F-4C1A-8933-263129D2AF90}" type="datetimeFigureOut">
+              <a:rPr lang="en-US" smtClean="0"/>
+              <a:t>12/30/2025</a:t>
+            </a:fld>
+            <a:endParaRPr lang="en-US" dirty="0"/>
+          </a:p>
+        </p:txBody>
+      </p:sp>
+      <p:sp>
+        <p:nvSpPr>
+          <p:cNvPr id="5" name="Footer Placeholder 4">
+            <a:extLst>
+              <a:ext uri="{FF2B5EF4-FFF2-40B4-BE49-F238E27FC236}">
+                <a16:creationId xmlns:a16="http://schemas.microsoft.com/office/drawing/2014/main" id="{5B68207E-B80A-E8E6-C8DA-BB687DFD66E4}"/>
+              </a:ext>
+            </a:extLst>
+          </p:cNvPr>
+          <p:cNvSpPr>
+            <a:spLocks noGrp="1"/>
+          </p:cNvSpPr>
+          <p:nvPr>
+            <p:ph type="ftr" sz="quarter" idx="11"/>
+          </p:nvPr>
+        </p:nvSpPr>
+        <p:spPr/>
+        <p:txBody>
+          <a:bodyPr/>
+          <a:lstStyle/>
+          <a:p>
+            <a:endParaRPr lang="en-US" dirty="0"/>
+          </a:p>
+        </p:txBody>
+      </p:sp>
+      <p:sp>
+        <p:nvSpPr>
+          <p:cNvPr id="6" name="Slide Number Placeholder 5">
+            <a:extLst>
+              <a:ext uri="{FF2B5EF4-FFF2-40B4-BE49-F238E27FC236}">
+                <a16:creationId xmlns:a16="http://schemas.microsoft.com/office/drawing/2014/main" id="{DDF3A426-F633-58AD-74D6-7DDE3915C407}"/>
+              </a:ext>
+            </a:extLst>
+          </p:cNvPr>
+          <p:cNvSpPr>
+            <a:spLocks noGrp="1"/>
+          </p:cNvSpPr>
+          <p:nvPr>
+            <p:ph type="sldNum" sz="quarter" idx="12"/>
+          </p:nvPr>
+        </p:nvSpPr>
+        <p:spPr/>
+        <p:txBody>
+          <a:bodyPr/>
+          <a:lstStyle/>
+          <a:p>
+            <a:fld id="{48F63A3B-78C7-47BE-AE5E-E10140E04643}" type="slidenum">
+              <a:rPr lang="en-US" smtClean="0"/>
+              <a:t>‹#›</a:t>
+            </a:fld>
+            <a:endParaRPr lang="en-US" dirty="0"/>
+          </a:p>
+        </p:txBody>
+      </p:sp>
+    </p:spTree>
+    <p:extLst>
+      <p:ext uri="{BB962C8B-B14F-4D97-AF65-F5344CB8AC3E}">
+        <p14:creationId xmlns:p14="http://schemas.microsoft.com/office/powerpoint/2010/main" val="3426713594"/>
+      </p:ext>
+    </p:extLst>
+  </p:cSld>
+  <p:clrMapOvr>
+    <a:masterClrMapping/>
+  </p:clrMapOvr>
+  <p:hf sldNum="0" hdr="0" ftr="0" dt="0"/>
+</p:sldLayout>
+</file>
+
+<file path=ppt/slideLayouts/slideLayout11.xml><?xml version="1.0" encoding="utf-8"?>
+<p:sldLayout xmlns:a="http://schemas.openxmlformats.org/drawingml/2006/main" xmlns:r="http://schemas.openxmlformats.org/officeDocument/2006/relationships" xmlns:p="http://schemas.openxmlformats.org/presentationml/2006/main" type="vertTitleAndTx" preserve="1">
+  <p:cSld name="Vertical Title and Text">
+    <p:spTree>
+      <p:nvGrpSpPr>
+        <p:cNvPr id="1" name=""/>
+        <p:cNvGrpSpPr/>
+        <p:nvPr/>
+      </p:nvGrpSpPr>
+      <p:grpSpPr>
+        <a:xfrm>
+          <a:off x="0" y="0"/>
+          <a:ext cx="0" cy="0"/>
+          <a:chOff x="0" y="0"/>
+          <a:chExt cx="0" cy="0"/>
+        </a:xfrm>
+      </p:grpSpPr>
+      <p:sp>
+        <p:nvSpPr>
+          <p:cNvPr id="2" name="Vertical Title 1">
+            <a:extLst>
+              <a:ext uri="{FF2B5EF4-FFF2-40B4-BE49-F238E27FC236}">
+                <a16:creationId xmlns:a16="http://schemas.microsoft.com/office/drawing/2014/main" id="{A6303161-EBE7-8B38-52A9-6460C05A1F3D}"/>
+              </a:ext>
+            </a:extLst>
+          </p:cNvPr>
+          <p:cNvSpPr>
+            <a:spLocks noGrp="1"/>
+          </p:cNvSpPr>
+          <p:nvPr>
+            <p:ph type="title" orient="vert"/>
+          </p:nvPr>
+        </p:nvSpPr>
+        <p:spPr>
+          <a:xfrm>
+            <a:off x="8724900" y="365125"/>
+            <a:ext cx="2628900" cy="5811838"/>
+          </a:xfrm>
+        </p:spPr>
+        <p:txBody>
+          <a:bodyPr vert="eaVert"/>
+          <a:lstStyle/>
+          <a:p>
+            <a:r>
+              <a:rPr lang="en-US"/>
+              <a:t>Click to edit Master title style</a:t>
+            </a:r>
+          </a:p>
+        </p:txBody>
+      </p:sp>
+      <p:sp>
+        <p:nvSpPr>
+          <p:cNvPr id="3" name="Vertical Text Placeholder 2">
+            <a:extLst>
+              <a:ext uri="{FF2B5EF4-FFF2-40B4-BE49-F238E27FC236}">
+                <a16:creationId xmlns:a16="http://schemas.microsoft.com/office/drawing/2014/main" id="{32838C48-49F0-F0F4-5918-EFC988B50F86}"/>
+              </a:ext>
+            </a:extLst>
+          </p:cNvPr>
+          <p:cNvSpPr>
+            <a:spLocks noGrp="1"/>
+          </p:cNvSpPr>
+          <p:nvPr>
+            <p:ph type="body" orient="vert" idx="1"/>
+          </p:nvPr>
+        </p:nvSpPr>
+        <p:spPr>
+          <a:xfrm>
+            <a:off x="838200" y="365125"/>
+            <a:ext cx="7734300" cy="5811838"/>
+          </a:xfrm>
+        </p:spPr>
+        <p:txBody>
+          <a:bodyPr vert="eaVert"/>
+          <a:lstStyle/>
+          <a:p>
+            <a:pPr lvl="0"/>
+            <a:r>
+              <a:rPr lang="en-US"/>
+              <a:t>Click to edit Master text styles</a:t>
+            </a:r>
+          </a:p>
+          <a:p>
+            <a:pPr lvl="1"/>
+            <a:r>
+              <a:rPr lang="en-US"/>
+              <a:t>Second level</a:t>
+            </a:r>
+          </a:p>
+          <a:p>
+            <a:pPr lvl="2"/>
+            <a:r>
+              <a:rPr lang="en-US"/>
+              <a:t>Third level</a:t>
+            </a:r>
+          </a:p>
+          <a:p>
+            <a:pPr lvl="3"/>
+            <a:r>
+              <a:rPr lang="en-US"/>
+              <a:t>Fourth level</a:t>
+            </a:r>
+          </a:p>
+          <a:p>
+            <a:pPr lvl="4"/>
+            <a:r>
+              <a:rPr lang="en-US"/>
+              <a:t>Fifth level</a:t>
+            </a:r>
+          </a:p>
+        </p:txBody>
+      </p:sp>
+      <p:sp>
+        <p:nvSpPr>
+          <p:cNvPr id="4" name="Date Placeholder 3">
+            <a:extLst>
+              <a:ext uri="{FF2B5EF4-FFF2-40B4-BE49-F238E27FC236}">
+                <a16:creationId xmlns:a16="http://schemas.microsoft.com/office/drawing/2014/main" id="{C839244F-BCAE-C2CC-EEA9-DEC069B3B916}"/>
+              </a:ext>
+            </a:extLst>
+          </p:cNvPr>
+          <p:cNvSpPr>
+            <a:spLocks noGrp="1"/>
+          </p:cNvSpPr>
+          <p:nvPr>
+            <p:ph type="dt" sz="half" idx="10"/>
+          </p:nvPr>
+        </p:nvSpPr>
+        <p:spPr/>
+        <p:txBody>
+          <a:bodyPr/>
+          <a:lstStyle/>
+          <a:p>
+            <a:fld id="{C764DE79-268F-4C1A-8933-263129D2AF90}" type="datetimeFigureOut">
+              <a:rPr lang="en-US" smtClean="0"/>
+              <a:t>12/30/2025</a:t>
+            </a:fld>
+            <a:endParaRPr lang="en-US" dirty="0"/>
+          </a:p>
+        </p:txBody>
+      </p:sp>
+      <p:sp>
+        <p:nvSpPr>
+          <p:cNvPr id="5" name="Footer Placeholder 4">
+            <a:extLst>
+              <a:ext uri="{FF2B5EF4-FFF2-40B4-BE49-F238E27FC236}">
+                <a16:creationId xmlns:a16="http://schemas.microsoft.com/office/drawing/2014/main" id="{E1850346-4023-3A27-7194-8168F6B76F55}"/>
+              </a:ext>
+            </a:extLst>
+          </p:cNvPr>
+          <p:cNvSpPr>
+            <a:spLocks noGrp="1"/>
+          </p:cNvSpPr>
+          <p:nvPr>
+            <p:ph type="ftr" sz="quarter" idx="11"/>
+          </p:nvPr>
+        </p:nvSpPr>
+        <p:spPr/>
+        <p:txBody>
+          <a:bodyPr/>
+          <a:lstStyle/>
+          <a:p>
+            <a:endParaRPr lang="en-US" dirty="0"/>
+          </a:p>
+        </p:txBody>
+      </p:sp>
+      <p:sp>
+        <p:nvSpPr>
+          <p:cNvPr id="6" name="Slide Number Placeholder 5">
+            <a:extLst>
+              <a:ext uri="{FF2B5EF4-FFF2-40B4-BE49-F238E27FC236}">
+                <a16:creationId xmlns:a16="http://schemas.microsoft.com/office/drawing/2014/main" id="{8A7E2B5F-1C43-32AB-F4FE-2AA058BF5EDB}"/>
+              </a:ext>
+            </a:extLst>
+          </p:cNvPr>
+          <p:cNvSpPr>
+            <a:spLocks noGrp="1"/>
+          </p:cNvSpPr>
+          <p:nvPr>
+            <p:ph type="sldNum" sz="quarter" idx="12"/>
+          </p:nvPr>
+        </p:nvSpPr>
+        <p:spPr/>
+        <p:txBody>
+          <a:bodyPr/>
+          <a:lstStyle/>
+          <a:p>
+            <a:fld id="{48F63A3B-78C7-47BE-AE5E-E10140E04643}" type="slidenum">
+              <a:rPr lang="en-US" smtClean="0"/>
+              <a:t>‹#›</a:t>
+            </a:fld>
+            <a:endParaRPr lang="en-US" dirty="0"/>
+          </a:p>
+        </p:txBody>
+      </p:sp>
+    </p:spTree>
+    <p:extLst>
+      <p:ext uri="{BB962C8B-B14F-4D97-AF65-F5344CB8AC3E}">
+        <p14:creationId xmlns:p14="http://schemas.microsoft.com/office/powerpoint/2010/main" val="2014679300"/>
+      </p:ext>
+    </p:extLst>
+  </p:cSld>
+  <p:clrMapOvr>
+    <a:masterClrMapping/>
+  </p:clrMapOvr>
+  <p:hf sldNum="0" hdr="0" ftr="0" dt="0"/>
+</p:sldLayout>
+</file>
+
+<file path=ppt/slideLayouts/slideLayout12.xml><?xml version="1.0" encoding="utf-8"?>
+<p:sldLayout xmlns:a="http://schemas.openxmlformats.org/drawingml/2006/main" xmlns:r="http://schemas.openxmlformats.org/officeDocument/2006/relationships" xmlns:p="http://schemas.openxmlformats.org/presentationml/2006/main">
   <p:cSld name="DEFAULT">
     <p:bg>
       <p:bgRef idx="1001">
@@ -3415,6 +3696,11 @@
         </a:xfrm>
       </p:grpSpPr>
     </p:spTree>
+    <p:extLst>
+      <p:ext uri="{BB962C8B-B14F-4D97-AF65-F5344CB8AC3E}">
+        <p14:creationId xmlns:p14="http://schemas.microsoft.com/office/powerpoint/2010/main" val="427889152"/>
+      </p:ext>
+    </p:extLst>
   </p:cSld>
   <p:clrMapOvr>
     <a:masterClrMapping/>
@@ -3422,9 +3708,9 @@
 </p:sldLayout>
 </file>
 
-<file path=ppt/slideMasters/slideMaster1.xml><?xml version="1.0" encoding="utf-8"?>
-<p:sldMaster xmlns:a="http://schemas.openxmlformats.org/drawingml/2006/main" xmlns:r="http://schemas.openxmlformats.org/officeDocument/2006/relationships" xmlns:p="http://schemas.openxmlformats.org/presentationml/2006/main">
-  <p:cSld>
+<file path=ppt/slideLayouts/slideLayout2.xml><?xml version="1.0" encoding="utf-8"?>
+<p:sldLayout xmlns:a="http://schemas.openxmlformats.org/drawingml/2006/main" xmlns:r="http://schemas.openxmlformats.org/officeDocument/2006/relationships" xmlns:p="http://schemas.openxmlformats.org/presentationml/2006/main" type="obj" preserve="1">
+  <p:cSld name="Title and Content">
     <p:spTree>
       <p:nvGrpSpPr>
         <p:cNvPr id="1" name=""/>
@@ -3439,16 +3725,2293 @@
           <a:chExt cx="0" cy="0"/>
         </a:xfrm>
       </p:grpSpPr>
+      <p:sp>
+        <p:nvSpPr>
+          <p:cNvPr id="2" name="Title 1">
+            <a:extLst>
+              <a:ext uri="{FF2B5EF4-FFF2-40B4-BE49-F238E27FC236}">
+                <a16:creationId xmlns:a16="http://schemas.microsoft.com/office/drawing/2014/main" id="{486542CD-1C3A-CBF5-FAE4-1855B10ED0DE}"/>
+              </a:ext>
+            </a:extLst>
+          </p:cNvPr>
+          <p:cNvSpPr>
+            <a:spLocks noGrp="1"/>
+          </p:cNvSpPr>
+          <p:nvPr>
+            <p:ph type="title"/>
+          </p:nvPr>
+        </p:nvSpPr>
+        <p:spPr/>
+        <p:txBody>
+          <a:bodyPr/>
+          <a:lstStyle/>
+          <a:p>
+            <a:r>
+              <a:rPr lang="en-US"/>
+              <a:t>Click to edit Master title style</a:t>
+            </a:r>
+          </a:p>
+        </p:txBody>
+      </p:sp>
+      <p:sp>
+        <p:nvSpPr>
+          <p:cNvPr id="3" name="Content Placeholder 2">
+            <a:extLst>
+              <a:ext uri="{FF2B5EF4-FFF2-40B4-BE49-F238E27FC236}">
+                <a16:creationId xmlns:a16="http://schemas.microsoft.com/office/drawing/2014/main" id="{90EABFB5-DC25-6C45-1BC9-311E71BF9671}"/>
+              </a:ext>
+            </a:extLst>
+          </p:cNvPr>
+          <p:cNvSpPr>
+            <a:spLocks noGrp="1"/>
+          </p:cNvSpPr>
+          <p:nvPr>
+            <p:ph idx="1"/>
+          </p:nvPr>
+        </p:nvSpPr>
+        <p:spPr/>
+        <p:txBody>
+          <a:bodyPr/>
+          <a:lstStyle/>
+          <a:p>
+            <a:pPr lvl="0"/>
+            <a:r>
+              <a:rPr lang="en-US"/>
+              <a:t>Click to edit Master text styles</a:t>
+            </a:r>
+          </a:p>
+          <a:p>
+            <a:pPr lvl="1"/>
+            <a:r>
+              <a:rPr lang="en-US"/>
+              <a:t>Second level</a:t>
+            </a:r>
+          </a:p>
+          <a:p>
+            <a:pPr lvl="2"/>
+            <a:r>
+              <a:rPr lang="en-US"/>
+              <a:t>Third level</a:t>
+            </a:r>
+          </a:p>
+          <a:p>
+            <a:pPr lvl="3"/>
+            <a:r>
+              <a:rPr lang="en-US"/>
+              <a:t>Fourth level</a:t>
+            </a:r>
+          </a:p>
+          <a:p>
+            <a:pPr lvl="4"/>
+            <a:r>
+              <a:rPr lang="en-US"/>
+              <a:t>Fifth level</a:t>
+            </a:r>
+          </a:p>
+        </p:txBody>
+      </p:sp>
+      <p:sp>
+        <p:nvSpPr>
+          <p:cNvPr id="4" name="Date Placeholder 3">
+            <a:extLst>
+              <a:ext uri="{FF2B5EF4-FFF2-40B4-BE49-F238E27FC236}">
+                <a16:creationId xmlns:a16="http://schemas.microsoft.com/office/drawing/2014/main" id="{B90613E8-4103-73A6-E7BD-725689A2DBDA}"/>
+              </a:ext>
+            </a:extLst>
+          </p:cNvPr>
+          <p:cNvSpPr>
+            <a:spLocks noGrp="1"/>
+          </p:cNvSpPr>
+          <p:nvPr>
+            <p:ph type="dt" sz="half" idx="10"/>
+          </p:nvPr>
+        </p:nvSpPr>
+        <p:spPr/>
+        <p:txBody>
+          <a:bodyPr/>
+          <a:lstStyle/>
+          <a:p>
+            <a:fld id="{C764DE79-268F-4C1A-8933-263129D2AF90}" type="datetimeFigureOut">
+              <a:rPr lang="en-US" smtClean="0"/>
+              <a:t>12/30/2025</a:t>
+            </a:fld>
+            <a:endParaRPr lang="en-US" dirty="0"/>
+          </a:p>
+        </p:txBody>
+      </p:sp>
+      <p:sp>
+        <p:nvSpPr>
+          <p:cNvPr id="5" name="Footer Placeholder 4">
+            <a:extLst>
+              <a:ext uri="{FF2B5EF4-FFF2-40B4-BE49-F238E27FC236}">
+                <a16:creationId xmlns:a16="http://schemas.microsoft.com/office/drawing/2014/main" id="{357981C5-26AE-96F9-3EAC-775943AC06FA}"/>
+              </a:ext>
+            </a:extLst>
+          </p:cNvPr>
+          <p:cNvSpPr>
+            <a:spLocks noGrp="1"/>
+          </p:cNvSpPr>
+          <p:nvPr>
+            <p:ph type="ftr" sz="quarter" idx="11"/>
+          </p:nvPr>
+        </p:nvSpPr>
+        <p:spPr/>
+        <p:txBody>
+          <a:bodyPr/>
+          <a:lstStyle/>
+          <a:p>
+            <a:endParaRPr lang="en-US" dirty="0"/>
+          </a:p>
+        </p:txBody>
+      </p:sp>
+      <p:sp>
+        <p:nvSpPr>
+          <p:cNvPr id="6" name="Slide Number Placeholder 5">
+            <a:extLst>
+              <a:ext uri="{FF2B5EF4-FFF2-40B4-BE49-F238E27FC236}">
+                <a16:creationId xmlns:a16="http://schemas.microsoft.com/office/drawing/2014/main" id="{B103BEAC-0396-E7C0-AA44-B0B1C531E2C6}"/>
+              </a:ext>
+            </a:extLst>
+          </p:cNvPr>
+          <p:cNvSpPr>
+            <a:spLocks noGrp="1"/>
+          </p:cNvSpPr>
+          <p:nvPr>
+            <p:ph type="sldNum" sz="quarter" idx="12"/>
+          </p:nvPr>
+        </p:nvSpPr>
+        <p:spPr/>
+        <p:txBody>
+          <a:bodyPr/>
+          <a:lstStyle/>
+          <a:p>
+            <a:fld id="{48F63A3B-78C7-47BE-AE5E-E10140E04643}" type="slidenum">
+              <a:rPr lang="en-US" smtClean="0"/>
+              <a:t>‹#›</a:t>
+            </a:fld>
+            <a:endParaRPr lang="en-US" dirty="0"/>
+          </a:p>
+        </p:txBody>
+      </p:sp>
     </p:spTree>
+    <p:extLst>
+      <p:ext uri="{BB962C8B-B14F-4D97-AF65-F5344CB8AC3E}">
+        <p14:creationId xmlns:p14="http://schemas.microsoft.com/office/powerpoint/2010/main" val="3484521970"/>
+      </p:ext>
+    </p:extLst>
+  </p:cSld>
+  <p:clrMapOvr>
+    <a:masterClrMapping/>
+  </p:clrMapOvr>
+  <p:hf sldNum="0" hdr="0" ftr="0" dt="0"/>
+</p:sldLayout>
+</file>
+
+<file path=ppt/slideLayouts/slideLayout3.xml><?xml version="1.0" encoding="utf-8"?>
+<p:sldLayout xmlns:a="http://schemas.openxmlformats.org/drawingml/2006/main" xmlns:r="http://schemas.openxmlformats.org/officeDocument/2006/relationships" xmlns:p="http://schemas.openxmlformats.org/presentationml/2006/main" type="secHead" preserve="1">
+  <p:cSld name="Section Header">
+    <p:spTree>
+      <p:nvGrpSpPr>
+        <p:cNvPr id="1" name=""/>
+        <p:cNvGrpSpPr/>
+        <p:nvPr/>
+      </p:nvGrpSpPr>
+      <p:grpSpPr>
+        <a:xfrm>
+          <a:off x="0" y="0"/>
+          <a:ext cx="0" cy="0"/>
+          <a:chOff x="0" y="0"/>
+          <a:chExt cx="0" cy="0"/>
+        </a:xfrm>
+      </p:grpSpPr>
+      <p:sp>
+        <p:nvSpPr>
+          <p:cNvPr id="2" name="Title 1">
+            <a:extLst>
+              <a:ext uri="{FF2B5EF4-FFF2-40B4-BE49-F238E27FC236}">
+                <a16:creationId xmlns:a16="http://schemas.microsoft.com/office/drawing/2014/main" id="{E0F81EE9-E1C8-B2CA-1147-D52E4D393A66}"/>
+              </a:ext>
+            </a:extLst>
+          </p:cNvPr>
+          <p:cNvSpPr>
+            <a:spLocks noGrp="1"/>
+          </p:cNvSpPr>
+          <p:nvPr>
+            <p:ph type="title"/>
+          </p:nvPr>
+        </p:nvSpPr>
+        <p:spPr>
+          <a:xfrm>
+            <a:off x="831850" y="1709738"/>
+            <a:ext cx="10515600" cy="2852737"/>
+          </a:xfrm>
+        </p:spPr>
+        <p:txBody>
+          <a:bodyPr anchor="b"/>
+          <a:lstStyle>
+            <a:lvl1pPr>
+              <a:defRPr sz="6000"/>
+            </a:lvl1pPr>
+          </a:lstStyle>
+          <a:p>
+            <a:r>
+              <a:rPr lang="en-US"/>
+              <a:t>Click to edit Master title style</a:t>
+            </a:r>
+          </a:p>
+        </p:txBody>
+      </p:sp>
+      <p:sp>
+        <p:nvSpPr>
+          <p:cNvPr id="3" name="Text Placeholder 2">
+            <a:extLst>
+              <a:ext uri="{FF2B5EF4-FFF2-40B4-BE49-F238E27FC236}">
+                <a16:creationId xmlns:a16="http://schemas.microsoft.com/office/drawing/2014/main" id="{6CD76E59-39E3-FE8D-F0C3-D572E206659D}"/>
+              </a:ext>
+            </a:extLst>
+          </p:cNvPr>
+          <p:cNvSpPr>
+            <a:spLocks noGrp="1"/>
+          </p:cNvSpPr>
+          <p:nvPr>
+            <p:ph type="body" idx="1"/>
+          </p:nvPr>
+        </p:nvSpPr>
+        <p:spPr>
+          <a:xfrm>
+            <a:off x="831850" y="4589463"/>
+            <a:ext cx="10515600" cy="1500187"/>
+          </a:xfrm>
+        </p:spPr>
+        <p:txBody>
+          <a:bodyPr/>
+          <a:lstStyle>
+            <a:lvl1pPr marL="0" indent="0">
+              <a:buNone/>
+              <a:defRPr sz="2400">
+                <a:solidFill>
+                  <a:schemeClr val="tx1">
+                    <a:tint val="75000"/>
+                  </a:schemeClr>
+                </a:solidFill>
+              </a:defRPr>
+            </a:lvl1pPr>
+            <a:lvl2pPr marL="457200" indent="0">
+              <a:buNone/>
+              <a:defRPr sz="2000">
+                <a:solidFill>
+                  <a:schemeClr val="tx1">
+                    <a:tint val="75000"/>
+                  </a:schemeClr>
+                </a:solidFill>
+              </a:defRPr>
+            </a:lvl2pPr>
+            <a:lvl3pPr marL="914400" indent="0">
+              <a:buNone/>
+              <a:defRPr sz="1800">
+                <a:solidFill>
+                  <a:schemeClr val="tx1">
+                    <a:tint val="75000"/>
+                  </a:schemeClr>
+                </a:solidFill>
+              </a:defRPr>
+            </a:lvl3pPr>
+            <a:lvl4pPr marL="1371600" indent="0">
+              <a:buNone/>
+              <a:defRPr sz="1600">
+                <a:solidFill>
+                  <a:schemeClr val="tx1">
+                    <a:tint val="75000"/>
+                  </a:schemeClr>
+                </a:solidFill>
+              </a:defRPr>
+            </a:lvl4pPr>
+            <a:lvl5pPr marL="1828800" indent="0">
+              <a:buNone/>
+              <a:defRPr sz="1600">
+                <a:solidFill>
+                  <a:schemeClr val="tx1">
+                    <a:tint val="75000"/>
+                  </a:schemeClr>
+                </a:solidFill>
+              </a:defRPr>
+            </a:lvl5pPr>
+            <a:lvl6pPr marL="2286000" indent="0">
+              <a:buNone/>
+              <a:defRPr sz="1600">
+                <a:solidFill>
+                  <a:schemeClr val="tx1">
+                    <a:tint val="75000"/>
+                  </a:schemeClr>
+                </a:solidFill>
+              </a:defRPr>
+            </a:lvl6pPr>
+            <a:lvl7pPr marL="2743200" indent="0">
+              <a:buNone/>
+              <a:defRPr sz="1600">
+                <a:solidFill>
+                  <a:schemeClr val="tx1">
+                    <a:tint val="75000"/>
+                  </a:schemeClr>
+                </a:solidFill>
+              </a:defRPr>
+            </a:lvl7pPr>
+            <a:lvl8pPr marL="3200400" indent="0">
+              <a:buNone/>
+              <a:defRPr sz="1600">
+                <a:solidFill>
+                  <a:schemeClr val="tx1">
+                    <a:tint val="75000"/>
+                  </a:schemeClr>
+                </a:solidFill>
+              </a:defRPr>
+            </a:lvl8pPr>
+            <a:lvl9pPr marL="3657600" indent="0">
+              <a:buNone/>
+              <a:defRPr sz="1600">
+                <a:solidFill>
+                  <a:schemeClr val="tx1">
+                    <a:tint val="75000"/>
+                  </a:schemeClr>
+                </a:solidFill>
+              </a:defRPr>
+            </a:lvl9pPr>
+          </a:lstStyle>
+          <a:p>
+            <a:pPr lvl="0"/>
+            <a:r>
+              <a:rPr lang="en-US"/>
+              <a:t>Click to edit Master text styles</a:t>
+            </a:r>
+          </a:p>
+        </p:txBody>
+      </p:sp>
+      <p:sp>
+        <p:nvSpPr>
+          <p:cNvPr id="4" name="Date Placeholder 3">
+            <a:extLst>
+              <a:ext uri="{FF2B5EF4-FFF2-40B4-BE49-F238E27FC236}">
+                <a16:creationId xmlns:a16="http://schemas.microsoft.com/office/drawing/2014/main" id="{9E82B1B4-7E40-8C7C-1AFC-7F0221491EB6}"/>
+              </a:ext>
+            </a:extLst>
+          </p:cNvPr>
+          <p:cNvSpPr>
+            <a:spLocks noGrp="1"/>
+          </p:cNvSpPr>
+          <p:nvPr>
+            <p:ph type="dt" sz="half" idx="10"/>
+          </p:nvPr>
+        </p:nvSpPr>
+        <p:spPr/>
+        <p:txBody>
+          <a:bodyPr/>
+          <a:lstStyle/>
+          <a:p>
+            <a:fld id="{C764DE79-268F-4C1A-8933-263129D2AF90}" type="datetimeFigureOut">
+              <a:rPr lang="en-US" smtClean="0"/>
+              <a:t>12/30/2025</a:t>
+            </a:fld>
+            <a:endParaRPr lang="en-US" dirty="0"/>
+          </a:p>
+        </p:txBody>
+      </p:sp>
+      <p:sp>
+        <p:nvSpPr>
+          <p:cNvPr id="5" name="Footer Placeholder 4">
+            <a:extLst>
+              <a:ext uri="{FF2B5EF4-FFF2-40B4-BE49-F238E27FC236}">
+                <a16:creationId xmlns:a16="http://schemas.microsoft.com/office/drawing/2014/main" id="{F05B3F5A-E519-CEB3-EAA1-2B1D2926E7D5}"/>
+              </a:ext>
+            </a:extLst>
+          </p:cNvPr>
+          <p:cNvSpPr>
+            <a:spLocks noGrp="1"/>
+          </p:cNvSpPr>
+          <p:nvPr>
+            <p:ph type="ftr" sz="quarter" idx="11"/>
+          </p:nvPr>
+        </p:nvSpPr>
+        <p:spPr/>
+        <p:txBody>
+          <a:bodyPr/>
+          <a:lstStyle/>
+          <a:p>
+            <a:endParaRPr lang="en-US" dirty="0"/>
+          </a:p>
+        </p:txBody>
+      </p:sp>
+      <p:sp>
+        <p:nvSpPr>
+          <p:cNvPr id="6" name="Slide Number Placeholder 5">
+            <a:extLst>
+              <a:ext uri="{FF2B5EF4-FFF2-40B4-BE49-F238E27FC236}">
+                <a16:creationId xmlns:a16="http://schemas.microsoft.com/office/drawing/2014/main" id="{4F4ADF57-A345-6FE6-FA67-3170CA481FE1}"/>
+              </a:ext>
+            </a:extLst>
+          </p:cNvPr>
+          <p:cNvSpPr>
+            <a:spLocks noGrp="1"/>
+          </p:cNvSpPr>
+          <p:nvPr>
+            <p:ph type="sldNum" sz="quarter" idx="12"/>
+          </p:nvPr>
+        </p:nvSpPr>
+        <p:spPr/>
+        <p:txBody>
+          <a:bodyPr/>
+          <a:lstStyle/>
+          <a:p>
+            <a:fld id="{48F63A3B-78C7-47BE-AE5E-E10140E04643}" type="slidenum">
+              <a:rPr lang="en-US" smtClean="0"/>
+              <a:t>‹#›</a:t>
+            </a:fld>
+            <a:endParaRPr lang="en-US" dirty="0"/>
+          </a:p>
+        </p:txBody>
+      </p:sp>
+    </p:spTree>
+    <p:extLst>
+      <p:ext uri="{BB962C8B-B14F-4D97-AF65-F5344CB8AC3E}">
+        <p14:creationId xmlns:p14="http://schemas.microsoft.com/office/powerpoint/2010/main" val="2088728086"/>
+      </p:ext>
+    </p:extLst>
+  </p:cSld>
+  <p:clrMapOvr>
+    <a:masterClrMapping/>
+  </p:clrMapOvr>
+  <p:hf sldNum="0" hdr="0" ftr="0" dt="0"/>
+</p:sldLayout>
+</file>
+
+<file path=ppt/slideLayouts/slideLayout4.xml><?xml version="1.0" encoding="utf-8"?>
+<p:sldLayout xmlns:a="http://schemas.openxmlformats.org/drawingml/2006/main" xmlns:r="http://schemas.openxmlformats.org/officeDocument/2006/relationships" xmlns:p="http://schemas.openxmlformats.org/presentationml/2006/main" type="twoObj" preserve="1">
+  <p:cSld name="Two Content">
+    <p:spTree>
+      <p:nvGrpSpPr>
+        <p:cNvPr id="1" name=""/>
+        <p:cNvGrpSpPr/>
+        <p:nvPr/>
+      </p:nvGrpSpPr>
+      <p:grpSpPr>
+        <a:xfrm>
+          <a:off x="0" y="0"/>
+          <a:ext cx="0" cy="0"/>
+          <a:chOff x="0" y="0"/>
+          <a:chExt cx="0" cy="0"/>
+        </a:xfrm>
+      </p:grpSpPr>
+      <p:sp>
+        <p:nvSpPr>
+          <p:cNvPr id="2" name="Title 1">
+            <a:extLst>
+              <a:ext uri="{FF2B5EF4-FFF2-40B4-BE49-F238E27FC236}">
+                <a16:creationId xmlns:a16="http://schemas.microsoft.com/office/drawing/2014/main" id="{6E57E855-851F-FF12-80BE-05D14BAA1991}"/>
+              </a:ext>
+            </a:extLst>
+          </p:cNvPr>
+          <p:cNvSpPr>
+            <a:spLocks noGrp="1"/>
+          </p:cNvSpPr>
+          <p:nvPr>
+            <p:ph type="title"/>
+          </p:nvPr>
+        </p:nvSpPr>
+        <p:spPr/>
+        <p:txBody>
+          <a:bodyPr/>
+          <a:lstStyle/>
+          <a:p>
+            <a:r>
+              <a:rPr lang="en-US"/>
+              <a:t>Click to edit Master title style</a:t>
+            </a:r>
+          </a:p>
+        </p:txBody>
+      </p:sp>
+      <p:sp>
+        <p:nvSpPr>
+          <p:cNvPr id="3" name="Content Placeholder 2">
+            <a:extLst>
+              <a:ext uri="{FF2B5EF4-FFF2-40B4-BE49-F238E27FC236}">
+                <a16:creationId xmlns:a16="http://schemas.microsoft.com/office/drawing/2014/main" id="{FD61994D-B249-31D9-4939-61B19EBA96DD}"/>
+              </a:ext>
+            </a:extLst>
+          </p:cNvPr>
+          <p:cNvSpPr>
+            <a:spLocks noGrp="1"/>
+          </p:cNvSpPr>
+          <p:nvPr>
+            <p:ph sz="half" idx="1"/>
+          </p:nvPr>
+        </p:nvSpPr>
+        <p:spPr>
+          <a:xfrm>
+            <a:off x="838200" y="1825625"/>
+            <a:ext cx="5181600" cy="4351338"/>
+          </a:xfrm>
+        </p:spPr>
+        <p:txBody>
+          <a:bodyPr/>
+          <a:lstStyle/>
+          <a:p>
+            <a:pPr lvl="0"/>
+            <a:r>
+              <a:rPr lang="en-US"/>
+              <a:t>Click to edit Master text styles</a:t>
+            </a:r>
+          </a:p>
+          <a:p>
+            <a:pPr lvl="1"/>
+            <a:r>
+              <a:rPr lang="en-US"/>
+              <a:t>Second level</a:t>
+            </a:r>
+          </a:p>
+          <a:p>
+            <a:pPr lvl="2"/>
+            <a:r>
+              <a:rPr lang="en-US"/>
+              <a:t>Third level</a:t>
+            </a:r>
+          </a:p>
+          <a:p>
+            <a:pPr lvl="3"/>
+            <a:r>
+              <a:rPr lang="en-US"/>
+              <a:t>Fourth level</a:t>
+            </a:r>
+          </a:p>
+          <a:p>
+            <a:pPr lvl="4"/>
+            <a:r>
+              <a:rPr lang="en-US"/>
+              <a:t>Fifth level</a:t>
+            </a:r>
+          </a:p>
+        </p:txBody>
+      </p:sp>
+      <p:sp>
+        <p:nvSpPr>
+          <p:cNvPr id="4" name="Content Placeholder 3">
+            <a:extLst>
+              <a:ext uri="{FF2B5EF4-FFF2-40B4-BE49-F238E27FC236}">
+                <a16:creationId xmlns:a16="http://schemas.microsoft.com/office/drawing/2014/main" id="{920CE40A-6F56-2D08-F608-FDAC0CE8FCB4}"/>
+              </a:ext>
+            </a:extLst>
+          </p:cNvPr>
+          <p:cNvSpPr>
+            <a:spLocks noGrp="1"/>
+          </p:cNvSpPr>
+          <p:nvPr>
+            <p:ph sz="half" idx="2"/>
+          </p:nvPr>
+        </p:nvSpPr>
+        <p:spPr>
+          <a:xfrm>
+            <a:off x="6172200" y="1825625"/>
+            <a:ext cx="5181600" cy="4351338"/>
+          </a:xfrm>
+        </p:spPr>
+        <p:txBody>
+          <a:bodyPr/>
+          <a:lstStyle/>
+          <a:p>
+            <a:pPr lvl="0"/>
+            <a:r>
+              <a:rPr lang="en-US"/>
+              <a:t>Click to edit Master text styles</a:t>
+            </a:r>
+          </a:p>
+          <a:p>
+            <a:pPr lvl="1"/>
+            <a:r>
+              <a:rPr lang="en-US"/>
+              <a:t>Second level</a:t>
+            </a:r>
+          </a:p>
+          <a:p>
+            <a:pPr lvl="2"/>
+            <a:r>
+              <a:rPr lang="en-US"/>
+              <a:t>Third level</a:t>
+            </a:r>
+          </a:p>
+          <a:p>
+            <a:pPr lvl="3"/>
+            <a:r>
+              <a:rPr lang="en-US"/>
+              <a:t>Fourth level</a:t>
+            </a:r>
+          </a:p>
+          <a:p>
+            <a:pPr lvl="4"/>
+            <a:r>
+              <a:rPr lang="en-US"/>
+              <a:t>Fifth level</a:t>
+            </a:r>
+          </a:p>
+        </p:txBody>
+      </p:sp>
+      <p:sp>
+        <p:nvSpPr>
+          <p:cNvPr id="5" name="Date Placeholder 4">
+            <a:extLst>
+              <a:ext uri="{FF2B5EF4-FFF2-40B4-BE49-F238E27FC236}">
+                <a16:creationId xmlns:a16="http://schemas.microsoft.com/office/drawing/2014/main" id="{E221E470-D1C8-64EA-799B-7A746BE1695C}"/>
+              </a:ext>
+            </a:extLst>
+          </p:cNvPr>
+          <p:cNvSpPr>
+            <a:spLocks noGrp="1"/>
+          </p:cNvSpPr>
+          <p:nvPr>
+            <p:ph type="dt" sz="half" idx="10"/>
+          </p:nvPr>
+        </p:nvSpPr>
+        <p:spPr/>
+        <p:txBody>
+          <a:bodyPr/>
+          <a:lstStyle/>
+          <a:p>
+            <a:fld id="{C764DE79-268F-4C1A-8933-263129D2AF90}" type="datetimeFigureOut">
+              <a:rPr lang="en-US" smtClean="0"/>
+              <a:t>12/30/2025</a:t>
+            </a:fld>
+            <a:endParaRPr lang="en-US" dirty="0"/>
+          </a:p>
+        </p:txBody>
+      </p:sp>
+      <p:sp>
+        <p:nvSpPr>
+          <p:cNvPr id="6" name="Footer Placeholder 5">
+            <a:extLst>
+              <a:ext uri="{FF2B5EF4-FFF2-40B4-BE49-F238E27FC236}">
+                <a16:creationId xmlns:a16="http://schemas.microsoft.com/office/drawing/2014/main" id="{A7F670D7-E70C-089B-F279-BF15CC170106}"/>
+              </a:ext>
+            </a:extLst>
+          </p:cNvPr>
+          <p:cNvSpPr>
+            <a:spLocks noGrp="1"/>
+          </p:cNvSpPr>
+          <p:nvPr>
+            <p:ph type="ftr" sz="quarter" idx="11"/>
+          </p:nvPr>
+        </p:nvSpPr>
+        <p:spPr/>
+        <p:txBody>
+          <a:bodyPr/>
+          <a:lstStyle/>
+          <a:p>
+            <a:endParaRPr lang="en-US" dirty="0"/>
+          </a:p>
+        </p:txBody>
+      </p:sp>
+      <p:sp>
+        <p:nvSpPr>
+          <p:cNvPr id="7" name="Slide Number Placeholder 6">
+            <a:extLst>
+              <a:ext uri="{FF2B5EF4-FFF2-40B4-BE49-F238E27FC236}">
+                <a16:creationId xmlns:a16="http://schemas.microsoft.com/office/drawing/2014/main" id="{7379C884-7E49-AD5E-552A-2E3D63986966}"/>
+              </a:ext>
+            </a:extLst>
+          </p:cNvPr>
+          <p:cNvSpPr>
+            <a:spLocks noGrp="1"/>
+          </p:cNvSpPr>
+          <p:nvPr>
+            <p:ph type="sldNum" sz="quarter" idx="12"/>
+          </p:nvPr>
+        </p:nvSpPr>
+        <p:spPr/>
+        <p:txBody>
+          <a:bodyPr/>
+          <a:lstStyle/>
+          <a:p>
+            <a:fld id="{48F63A3B-78C7-47BE-AE5E-E10140E04643}" type="slidenum">
+              <a:rPr lang="en-US" smtClean="0"/>
+              <a:t>‹#›</a:t>
+            </a:fld>
+            <a:endParaRPr lang="en-US" dirty="0"/>
+          </a:p>
+        </p:txBody>
+      </p:sp>
+    </p:spTree>
+    <p:extLst>
+      <p:ext uri="{BB962C8B-B14F-4D97-AF65-F5344CB8AC3E}">
+        <p14:creationId xmlns:p14="http://schemas.microsoft.com/office/powerpoint/2010/main" val="1767177292"/>
+      </p:ext>
+    </p:extLst>
+  </p:cSld>
+  <p:clrMapOvr>
+    <a:masterClrMapping/>
+  </p:clrMapOvr>
+  <p:hf sldNum="0" hdr="0" ftr="0" dt="0"/>
+</p:sldLayout>
+</file>
+
+<file path=ppt/slideLayouts/slideLayout5.xml><?xml version="1.0" encoding="utf-8"?>
+<p:sldLayout xmlns:a="http://schemas.openxmlformats.org/drawingml/2006/main" xmlns:r="http://schemas.openxmlformats.org/officeDocument/2006/relationships" xmlns:p="http://schemas.openxmlformats.org/presentationml/2006/main" type="twoTxTwoObj" preserve="1">
+  <p:cSld name="Comparison">
+    <p:spTree>
+      <p:nvGrpSpPr>
+        <p:cNvPr id="1" name=""/>
+        <p:cNvGrpSpPr/>
+        <p:nvPr/>
+      </p:nvGrpSpPr>
+      <p:grpSpPr>
+        <a:xfrm>
+          <a:off x="0" y="0"/>
+          <a:ext cx="0" cy="0"/>
+          <a:chOff x="0" y="0"/>
+          <a:chExt cx="0" cy="0"/>
+        </a:xfrm>
+      </p:grpSpPr>
+      <p:sp>
+        <p:nvSpPr>
+          <p:cNvPr id="2" name="Title 1">
+            <a:extLst>
+              <a:ext uri="{FF2B5EF4-FFF2-40B4-BE49-F238E27FC236}">
+                <a16:creationId xmlns:a16="http://schemas.microsoft.com/office/drawing/2014/main" id="{58C946A1-C198-687C-DD17-814F2062B633}"/>
+              </a:ext>
+            </a:extLst>
+          </p:cNvPr>
+          <p:cNvSpPr>
+            <a:spLocks noGrp="1"/>
+          </p:cNvSpPr>
+          <p:nvPr>
+            <p:ph type="title"/>
+          </p:nvPr>
+        </p:nvSpPr>
+        <p:spPr>
+          <a:xfrm>
+            <a:off x="839788" y="365125"/>
+            <a:ext cx="10515600" cy="1325563"/>
+          </a:xfrm>
+        </p:spPr>
+        <p:txBody>
+          <a:bodyPr/>
+          <a:lstStyle/>
+          <a:p>
+            <a:r>
+              <a:rPr lang="en-US"/>
+              <a:t>Click to edit Master title style</a:t>
+            </a:r>
+          </a:p>
+        </p:txBody>
+      </p:sp>
+      <p:sp>
+        <p:nvSpPr>
+          <p:cNvPr id="3" name="Text Placeholder 2">
+            <a:extLst>
+              <a:ext uri="{FF2B5EF4-FFF2-40B4-BE49-F238E27FC236}">
+                <a16:creationId xmlns:a16="http://schemas.microsoft.com/office/drawing/2014/main" id="{90D21398-C41A-874A-48CC-75DEA0E60E94}"/>
+              </a:ext>
+            </a:extLst>
+          </p:cNvPr>
+          <p:cNvSpPr>
+            <a:spLocks noGrp="1"/>
+          </p:cNvSpPr>
+          <p:nvPr>
+            <p:ph type="body" idx="1"/>
+          </p:nvPr>
+        </p:nvSpPr>
+        <p:spPr>
+          <a:xfrm>
+            <a:off x="839788" y="1681163"/>
+            <a:ext cx="5157787" cy="823912"/>
+          </a:xfrm>
+        </p:spPr>
+        <p:txBody>
+          <a:bodyPr anchor="b"/>
+          <a:lstStyle>
+            <a:lvl1pPr marL="0" indent="0">
+              <a:buNone/>
+              <a:defRPr sz="2400" b="1"/>
+            </a:lvl1pPr>
+            <a:lvl2pPr marL="457200" indent="0">
+              <a:buNone/>
+              <a:defRPr sz="2000" b="1"/>
+            </a:lvl2pPr>
+            <a:lvl3pPr marL="914400" indent="0">
+              <a:buNone/>
+              <a:defRPr sz="1800" b="1"/>
+            </a:lvl3pPr>
+            <a:lvl4pPr marL="1371600" indent="0">
+              <a:buNone/>
+              <a:defRPr sz="1600" b="1"/>
+            </a:lvl4pPr>
+            <a:lvl5pPr marL="1828800" indent="0">
+              <a:buNone/>
+              <a:defRPr sz="1600" b="1"/>
+            </a:lvl5pPr>
+            <a:lvl6pPr marL="2286000" indent="0">
+              <a:buNone/>
+              <a:defRPr sz="1600" b="1"/>
+            </a:lvl6pPr>
+            <a:lvl7pPr marL="2743200" indent="0">
+              <a:buNone/>
+              <a:defRPr sz="1600" b="1"/>
+            </a:lvl7pPr>
+            <a:lvl8pPr marL="3200400" indent="0">
+              <a:buNone/>
+              <a:defRPr sz="1600" b="1"/>
+            </a:lvl8pPr>
+            <a:lvl9pPr marL="3657600" indent="0">
+              <a:buNone/>
+              <a:defRPr sz="1600" b="1"/>
+            </a:lvl9pPr>
+          </a:lstStyle>
+          <a:p>
+            <a:pPr lvl="0"/>
+            <a:r>
+              <a:rPr lang="en-US"/>
+              <a:t>Click to edit Master text styles</a:t>
+            </a:r>
+          </a:p>
+        </p:txBody>
+      </p:sp>
+      <p:sp>
+        <p:nvSpPr>
+          <p:cNvPr id="4" name="Content Placeholder 3">
+            <a:extLst>
+              <a:ext uri="{FF2B5EF4-FFF2-40B4-BE49-F238E27FC236}">
+                <a16:creationId xmlns:a16="http://schemas.microsoft.com/office/drawing/2014/main" id="{F0A19DE1-FE93-50D7-570A-742ECAA4BC3E}"/>
+              </a:ext>
+            </a:extLst>
+          </p:cNvPr>
+          <p:cNvSpPr>
+            <a:spLocks noGrp="1"/>
+          </p:cNvSpPr>
+          <p:nvPr>
+            <p:ph sz="half" idx="2"/>
+          </p:nvPr>
+        </p:nvSpPr>
+        <p:spPr>
+          <a:xfrm>
+            <a:off x="839788" y="2505075"/>
+            <a:ext cx="5157787" cy="3684588"/>
+          </a:xfrm>
+        </p:spPr>
+        <p:txBody>
+          <a:bodyPr/>
+          <a:lstStyle/>
+          <a:p>
+            <a:pPr lvl="0"/>
+            <a:r>
+              <a:rPr lang="en-US"/>
+              <a:t>Click to edit Master text styles</a:t>
+            </a:r>
+          </a:p>
+          <a:p>
+            <a:pPr lvl="1"/>
+            <a:r>
+              <a:rPr lang="en-US"/>
+              <a:t>Second level</a:t>
+            </a:r>
+          </a:p>
+          <a:p>
+            <a:pPr lvl="2"/>
+            <a:r>
+              <a:rPr lang="en-US"/>
+              <a:t>Third level</a:t>
+            </a:r>
+          </a:p>
+          <a:p>
+            <a:pPr lvl="3"/>
+            <a:r>
+              <a:rPr lang="en-US"/>
+              <a:t>Fourth level</a:t>
+            </a:r>
+          </a:p>
+          <a:p>
+            <a:pPr lvl="4"/>
+            <a:r>
+              <a:rPr lang="en-US"/>
+              <a:t>Fifth level</a:t>
+            </a:r>
+          </a:p>
+        </p:txBody>
+      </p:sp>
+      <p:sp>
+        <p:nvSpPr>
+          <p:cNvPr id="5" name="Text Placeholder 4">
+            <a:extLst>
+              <a:ext uri="{FF2B5EF4-FFF2-40B4-BE49-F238E27FC236}">
+                <a16:creationId xmlns:a16="http://schemas.microsoft.com/office/drawing/2014/main" id="{D0A52004-5D33-B209-8559-9999988DA4FF}"/>
+              </a:ext>
+            </a:extLst>
+          </p:cNvPr>
+          <p:cNvSpPr>
+            <a:spLocks noGrp="1"/>
+          </p:cNvSpPr>
+          <p:nvPr>
+            <p:ph type="body" sz="quarter" idx="3"/>
+          </p:nvPr>
+        </p:nvSpPr>
+        <p:spPr>
+          <a:xfrm>
+            <a:off x="6172200" y="1681163"/>
+            <a:ext cx="5183188" cy="823912"/>
+          </a:xfrm>
+        </p:spPr>
+        <p:txBody>
+          <a:bodyPr anchor="b"/>
+          <a:lstStyle>
+            <a:lvl1pPr marL="0" indent="0">
+              <a:buNone/>
+              <a:defRPr sz="2400" b="1"/>
+            </a:lvl1pPr>
+            <a:lvl2pPr marL="457200" indent="0">
+              <a:buNone/>
+              <a:defRPr sz="2000" b="1"/>
+            </a:lvl2pPr>
+            <a:lvl3pPr marL="914400" indent="0">
+              <a:buNone/>
+              <a:defRPr sz="1800" b="1"/>
+            </a:lvl3pPr>
+            <a:lvl4pPr marL="1371600" indent="0">
+              <a:buNone/>
+              <a:defRPr sz="1600" b="1"/>
+            </a:lvl4pPr>
+            <a:lvl5pPr marL="1828800" indent="0">
+              <a:buNone/>
+              <a:defRPr sz="1600" b="1"/>
+            </a:lvl5pPr>
+            <a:lvl6pPr marL="2286000" indent="0">
+              <a:buNone/>
+              <a:defRPr sz="1600" b="1"/>
+            </a:lvl6pPr>
+            <a:lvl7pPr marL="2743200" indent="0">
+              <a:buNone/>
+              <a:defRPr sz="1600" b="1"/>
+            </a:lvl7pPr>
+            <a:lvl8pPr marL="3200400" indent="0">
+              <a:buNone/>
+              <a:defRPr sz="1600" b="1"/>
+            </a:lvl8pPr>
+            <a:lvl9pPr marL="3657600" indent="0">
+              <a:buNone/>
+              <a:defRPr sz="1600" b="1"/>
+            </a:lvl9pPr>
+          </a:lstStyle>
+          <a:p>
+            <a:pPr lvl="0"/>
+            <a:r>
+              <a:rPr lang="en-US"/>
+              <a:t>Click to edit Master text styles</a:t>
+            </a:r>
+          </a:p>
+        </p:txBody>
+      </p:sp>
+      <p:sp>
+        <p:nvSpPr>
+          <p:cNvPr id="6" name="Content Placeholder 5">
+            <a:extLst>
+              <a:ext uri="{FF2B5EF4-FFF2-40B4-BE49-F238E27FC236}">
+                <a16:creationId xmlns:a16="http://schemas.microsoft.com/office/drawing/2014/main" id="{BEE90CFE-D523-C7CC-9B6A-4D6D49CBD3F9}"/>
+              </a:ext>
+            </a:extLst>
+          </p:cNvPr>
+          <p:cNvSpPr>
+            <a:spLocks noGrp="1"/>
+          </p:cNvSpPr>
+          <p:nvPr>
+            <p:ph sz="quarter" idx="4"/>
+          </p:nvPr>
+        </p:nvSpPr>
+        <p:spPr>
+          <a:xfrm>
+            <a:off x="6172200" y="2505075"/>
+            <a:ext cx="5183188" cy="3684588"/>
+          </a:xfrm>
+        </p:spPr>
+        <p:txBody>
+          <a:bodyPr/>
+          <a:lstStyle/>
+          <a:p>
+            <a:pPr lvl="0"/>
+            <a:r>
+              <a:rPr lang="en-US"/>
+              <a:t>Click to edit Master text styles</a:t>
+            </a:r>
+          </a:p>
+          <a:p>
+            <a:pPr lvl="1"/>
+            <a:r>
+              <a:rPr lang="en-US"/>
+              <a:t>Second level</a:t>
+            </a:r>
+          </a:p>
+          <a:p>
+            <a:pPr lvl="2"/>
+            <a:r>
+              <a:rPr lang="en-US"/>
+              <a:t>Third level</a:t>
+            </a:r>
+          </a:p>
+          <a:p>
+            <a:pPr lvl="3"/>
+            <a:r>
+              <a:rPr lang="en-US"/>
+              <a:t>Fourth level</a:t>
+            </a:r>
+          </a:p>
+          <a:p>
+            <a:pPr lvl="4"/>
+            <a:r>
+              <a:rPr lang="en-US"/>
+              <a:t>Fifth level</a:t>
+            </a:r>
+          </a:p>
+        </p:txBody>
+      </p:sp>
+      <p:sp>
+        <p:nvSpPr>
+          <p:cNvPr id="7" name="Date Placeholder 6">
+            <a:extLst>
+              <a:ext uri="{FF2B5EF4-FFF2-40B4-BE49-F238E27FC236}">
+                <a16:creationId xmlns:a16="http://schemas.microsoft.com/office/drawing/2014/main" id="{023B82A7-B840-8FD1-3166-A65774A1DB5E}"/>
+              </a:ext>
+            </a:extLst>
+          </p:cNvPr>
+          <p:cNvSpPr>
+            <a:spLocks noGrp="1"/>
+          </p:cNvSpPr>
+          <p:nvPr>
+            <p:ph type="dt" sz="half" idx="10"/>
+          </p:nvPr>
+        </p:nvSpPr>
+        <p:spPr/>
+        <p:txBody>
+          <a:bodyPr/>
+          <a:lstStyle/>
+          <a:p>
+            <a:fld id="{C764DE79-268F-4C1A-8933-263129D2AF90}" type="datetimeFigureOut">
+              <a:rPr lang="en-US" smtClean="0"/>
+              <a:t>12/30/2025</a:t>
+            </a:fld>
+            <a:endParaRPr lang="en-US" dirty="0"/>
+          </a:p>
+        </p:txBody>
+      </p:sp>
+      <p:sp>
+        <p:nvSpPr>
+          <p:cNvPr id="8" name="Footer Placeholder 7">
+            <a:extLst>
+              <a:ext uri="{FF2B5EF4-FFF2-40B4-BE49-F238E27FC236}">
+                <a16:creationId xmlns:a16="http://schemas.microsoft.com/office/drawing/2014/main" id="{91A7ECB2-4A81-A32C-FB36-8C32133898B3}"/>
+              </a:ext>
+            </a:extLst>
+          </p:cNvPr>
+          <p:cNvSpPr>
+            <a:spLocks noGrp="1"/>
+          </p:cNvSpPr>
+          <p:nvPr>
+            <p:ph type="ftr" sz="quarter" idx="11"/>
+          </p:nvPr>
+        </p:nvSpPr>
+        <p:spPr/>
+        <p:txBody>
+          <a:bodyPr/>
+          <a:lstStyle/>
+          <a:p>
+            <a:endParaRPr lang="en-US" dirty="0"/>
+          </a:p>
+        </p:txBody>
+      </p:sp>
+      <p:sp>
+        <p:nvSpPr>
+          <p:cNvPr id="9" name="Slide Number Placeholder 8">
+            <a:extLst>
+              <a:ext uri="{FF2B5EF4-FFF2-40B4-BE49-F238E27FC236}">
+                <a16:creationId xmlns:a16="http://schemas.microsoft.com/office/drawing/2014/main" id="{8B6986DA-DCC5-A246-14DB-1D5AA5B085B8}"/>
+              </a:ext>
+            </a:extLst>
+          </p:cNvPr>
+          <p:cNvSpPr>
+            <a:spLocks noGrp="1"/>
+          </p:cNvSpPr>
+          <p:nvPr>
+            <p:ph type="sldNum" sz="quarter" idx="12"/>
+          </p:nvPr>
+        </p:nvSpPr>
+        <p:spPr/>
+        <p:txBody>
+          <a:bodyPr/>
+          <a:lstStyle/>
+          <a:p>
+            <a:fld id="{48F63A3B-78C7-47BE-AE5E-E10140E04643}" type="slidenum">
+              <a:rPr lang="en-US" smtClean="0"/>
+              <a:t>‹#›</a:t>
+            </a:fld>
+            <a:endParaRPr lang="en-US" dirty="0"/>
+          </a:p>
+        </p:txBody>
+      </p:sp>
+    </p:spTree>
+    <p:extLst>
+      <p:ext uri="{BB962C8B-B14F-4D97-AF65-F5344CB8AC3E}">
+        <p14:creationId xmlns:p14="http://schemas.microsoft.com/office/powerpoint/2010/main" val="1326619013"/>
+      </p:ext>
+    </p:extLst>
+  </p:cSld>
+  <p:clrMapOvr>
+    <a:masterClrMapping/>
+  </p:clrMapOvr>
+  <p:hf sldNum="0" hdr="0" ftr="0" dt="0"/>
+</p:sldLayout>
+</file>
+
+<file path=ppt/slideLayouts/slideLayout6.xml><?xml version="1.0" encoding="utf-8"?>
+<p:sldLayout xmlns:a="http://schemas.openxmlformats.org/drawingml/2006/main" xmlns:r="http://schemas.openxmlformats.org/officeDocument/2006/relationships" xmlns:p="http://schemas.openxmlformats.org/presentationml/2006/main" type="titleOnly" preserve="1">
+  <p:cSld name="Title Only">
+    <p:spTree>
+      <p:nvGrpSpPr>
+        <p:cNvPr id="1" name=""/>
+        <p:cNvGrpSpPr/>
+        <p:nvPr/>
+      </p:nvGrpSpPr>
+      <p:grpSpPr>
+        <a:xfrm>
+          <a:off x="0" y="0"/>
+          <a:ext cx="0" cy="0"/>
+          <a:chOff x="0" y="0"/>
+          <a:chExt cx="0" cy="0"/>
+        </a:xfrm>
+      </p:grpSpPr>
+      <p:sp>
+        <p:nvSpPr>
+          <p:cNvPr id="2" name="Title 1">
+            <a:extLst>
+              <a:ext uri="{FF2B5EF4-FFF2-40B4-BE49-F238E27FC236}">
+                <a16:creationId xmlns:a16="http://schemas.microsoft.com/office/drawing/2014/main" id="{FA5ED4A2-B064-D3B9-FFA0-1F63B50E1902}"/>
+              </a:ext>
+            </a:extLst>
+          </p:cNvPr>
+          <p:cNvSpPr>
+            <a:spLocks noGrp="1"/>
+          </p:cNvSpPr>
+          <p:nvPr>
+            <p:ph type="title"/>
+          </p:nvPr>
+        </p:nvSpPr>
+        <p:spPr/>
+        <p:txBody>
+          <a:bodyPr/>
+          <a:lstStyle/>
+          <a:p>
+            <a:r>
+              <a:rPr lang="en-US"/>
+              <a:t>Click to edit Master title style</a:t>
+            </a:r>
+          </a:p>
+        </p:txBody>
+      </p:sp>
+      <p:sp>
+        <p:nvSpPr>
+          <p:cNvPr id="3" name="Date Placeholder 2">
+            <a:extLst>
+              <a:ext uri="{FF2B5EF4-FFF2-40B4-BE49-F238E27FC236}">
+                <a16:creationId xmlns:a16="http://schemas.microsoft.com/office/drawing/2014/main" id="{25FA0DFB-672B-DD96-2A3B-B5117A6A9001}"/>
+              </a:ext>
+            </a:extLst>
+          </p:cNvPr>
+          <p:cNvSpPr>
+            <a:spLocks noGrp="1"/>
+          </p:cNvSpPr>
+          <p:nvPr>
+            <p:ph type="dt" sz="half" idx="10"/>
+          </p:nvPr>
+        </p:nvSpPr>
+        <p:spPr/>
+        <p:txBody>
+          <a:bodyPr/>
+          <a:lstStyle/>
+          <a:p>
+            <a:fld id="{C764DE79-268F-4C1A-8933-263129D2AF90}" type="datetimeFigureOut">
+              <a:rPr lang="en-US" smtClean="0"/>
+              <a:t>12/30/2025</a:t>
+            </a:fld>
+            <a:endParaRPr lang="en-US" dirty="0"/>
+          </a:p>
+        </p:txBody>
+      </p:sp>
+      <p:sp>
+        <p:nvSpPr>
+          <p:cNvPr id="4" name="Footer Placeholder 3">
+            <a:extLst>
+              <a:ext uri="{FF2B5EF4-FFF2-40B4-BE49-F238E27FC236}">
+                <a16:creationId xmlns:a16="http://schemas.microsoft.com/office/drawing/2014/main" id="{AD0D594B-13DB-6D09-E4AE-4921046F16EB}"/>
+              </a:ext>
+            </a:extLst>
+          </p:cNvPr>
+          <p:cNvSpPr>
+            <a:spLocks noGrp="1"/>
+          </p:cNvSpPr>
+          <p:nvPr>
+            <p:ph type="ftr" sz="quarter" idx="11"/>
+          </p:nvPr>
+        </p:nvSpPr>
+        <p:spPr/>
+        <p:txBody>
+          <a:bodyPr/>
+          <a:lstStyle/>
+          <a:p>
+            <a:endParaRPr lang="en-US" dirty="0"/>
+          </a:p>
+        </p:txBody>
+      </p:sp>
+      <p:sp>
+        <p:nvSpPr>
+          <p:cNvPr id="5" name="Slide Number Placeholder 4">
+            <a:extLst>
+              <a:ext uri="{FF2B5EF4-FFF2-40B4-BE49-F238E27FC236}">
+                <a16:creationId xmlns:a16="http://schemas.microsoft.com/office/drawing/2014/main" id="{78242E50-27A6-165F-6203-61C17138BAF0}"/>
+              </a:ext>
+            </a:extLst>
+          </p:cNvPr>
+          <p:cNvSpPr>
+            <a:spLocks noGrp="1"/>
+          </p:cNvSpPr>
+          <p:nvPr>
+            <p:ph type="sldNum" sz="quarter" idx="12"/>
+          </p:nvPr>
+        </p:nvSpPr>
+        <p:spPr/>
+        <p:txBody>
+          <a:bodyPr/>
+          <a:lstStyle/>
+          <a:p>
+            <a:fld id="{48F63A3B-78C7-47BE-AE5E-E10140E04643}" type="slidenum">
+              <a:rPr lang="en-US" smtClean="0"/>
+              <a:t>‹#›</a:t>
+            </a:fld>
+            <a:endParaRPr lang="en-US" dirty="0"/>
+          </a:p>
+        </p:txBody>
+      </p:sp>
+    </p:spTree>
+    <p:extLst>
+      <p:ext uri="{BB962C8B-B14F-4D97-AF65-F5344CB8AC3E}">
+        <p14:creationId xmlns:p14="http://schemas.microsoft.com/office/powerpoint/2010/main" val="631012077"/>
+      </p:ext>
+    </p:extLst>
+  </p:cSld>
+  <p:clrMapOvr>
+    <a:masterClrMapping/>
+  </p:clrMapOvr>
+  <p:hf sldNum="0" hdr="0" ftr="0" dt="0"/>
+</p:sldLayout>
+</file>
+
+<file path=ppt/slideLayouts/slideLayout7.xml><?xml version="1.0" encoding="utf-8"?>
+<p:sldLayout xmlns:a="http://schemas.openxmlformats.org/drawingml/2006/main" xmlns:r="http://schemas.openxmlformats.org/officeDocument/2006/relationships" xmlns:p="http://schemas.openxmlformats.org/presentationml/2006/main" type="blank" preserve="1">
+  <p:cSld name="Blank">
+    <p:spTree>
+      <p:nvGrpSpPr>
+        <p:cNvPr id="1" name=""/>
+        <p:cNvGrpSpPr/>
+        <p:nvPr/>
+      </p:nvGrpSpPr>
+      <p:grpSpPr>
+        <a:xfrm>
+          <a:off x="0" y="0"/>
+          <a:ext cx="0" cy="0"/>
+          <a:chOff x="0" y="0"/>
+          <a:chExt cx="0" cy="0"/>
+        </a:xfrm>
+      </p:grpSpPr>
+      <p:sp>
+        <p:nvSpPr>
+          <p:cNvPr id="2" name="Date Placeholder 1">
+            <a:extLst>
+              <a:ext uri="{FF2B5EF4-FFF2-40B4-BE49-F238E27FC236}">
+                <a16:creationId xmlns:a16="http://schemas.microsoft.com/office/drawing/2014/main" id="{7469A601-5510-1044-3CCC-A0DD63F7A8C8}"/>
+              </a:ext>
+            </a:extLst>
+          </p:cNvPr>
+          <p:cNvSpPr>
+            <a:spLocks noGrp="1"/>
+          </p:cNvSpPr>
+          <p:nvPr>
+            <p:ph type="dt" sz="half" idx="10"/>
+          </p:nvPr>
+        </p:nvSpPr>
+        <p:spPr/>
+        <p:txBody>
+          <a:bodyPr/>
+          <a:lstStyle/>
+          <a:p>
+            <a:fld id="{C764DE79-268F-4C1A-8933-263129D2AF90}" type="datetimeFigureOut">
+              <a:rPr lang="en-US" smtClean="0"/>
+              <a:t>12/30/2025</a:t>
+            </a:fld>
+            <a:endParaRPr lang="en-US" dirty="0"/>
+          </a:p>
+        </p:txBody>
+      </p:sp>
+      <p:sp>
+        <p:nvSpPr>
+          <p:cNvPr id="3" name="Footer Placeholder 2">
+            <a:extLst>
+              <a:ext uri="{FF2B5EF4-FFF2-40B4-BE49-F238E27FC236}">
+                <a16:creationId xmlns:a16="http://schemas.microsoft.com/office/drawing/2014/main" id="{20C4E881-CFDC-C33E-3C9B-1C771284C6EA}"/>
+              </a:ext>
+            </a:extLst>
+          </p:cNvPr>
+          <p:cNvSpPr>
+            <a:spLocks noGrp="1"/>
+          </p:cNvSpPr>
+          <p:nvPr>
+            <p:ph type="ftr" sz="quarter" idx="11"/>
+          </p:nvPr>
+        </p:nvSpPr>
+        <p:spPr/>
+        <p:txBody>
+          <a:bodyPr/>
+          <a:lstStyle/>
+          <a:p>
+            <a:endParaRPr lang="en-US" dirty="0"/>
+          </a:p>
+        </p:txBody>
+      </p:sp>
+      <p:sp>
+        <p:nvSpPr>
+          <p:cNvPr id="4" name="Slide Number Placeholder 3">
+            <a:extLst>
+              <a:ext uri="{FF2B5EF4-FFF2-40B4-BE49-F238E27FC236}">
+                <a16:creationId xmlns:a16="http://schemas.microsoft.com/office/drawing/2014/main" id="{9B84FD04-1721-AAFA-6D3E-E41E3700D16F}"/>
+              </a:ext>
+            </a:extLst>
+          </p:cNvPr>
+          <p:cNvSpPr>
+            <a:spLocks noGrp="1"/>
+          </p:cNvSpPr>
+          <p:nvPr>
+            <p:ph type="sldNum" sz="quarter" idx="12"/>
+          </p:nvPr>
+        </p:nvSpPr>
+        <p:spPr/>
+        <p:txBody>
+          <a:bodyPr/>
+          <a:lstStyle/>
+          <a:p>
+            <a:fld id="{48F63A3B-78C7-47BE-AE5E-E10140E04643}" type="slidenum">
+              <a:rPr lang="en-US" smtClean="0"/>
+              <a:t>‹#›</a:t>
+            </a:fld>
+            <a:endParaRPr lang="en-US" dirty="0"/>
+          </a:p>
+        </p:txBody>
+      </p:sp>
+    </p:spTree>
+    <p:extLst>
+      <p:ext uri="{BB962C8B-B14F-4D97-AF65-F5344CB8AC3E}">
+        <p14:creationId xmlns:p14="http://schemas.microsoft.com/office/powerpoint/2010/main" val="2154716196"/>
+      </p:ext>
+    </p:extLst>
+  </p:cSld>
+  <p:clrMapOvr>
+    <a:masterClrMapping/>
+  </p:clrMapOvr>
+  <p:hf sldNum="0" hdr="0" ftr="0" dt="0"/>
+</p:sldLayout>
+</file>
+
+<file path=ppt/slideLayouts/slideLayout8.xml><?xml version="1.0" encoding="utf-8"?>
+<p:sldLayout xmlns:a="http://schemas.openxmlformats.org/drawingml/2006/main" xmlns:r="http://schemas.openxmlformats.org/officeDocument/2006/relationships" xmlns:p="http://schemas.openxmlformats.org/presentationml/2006/main" type="objTx" preserve="1">
+  <p:cSld name="Content with Caption">
+    <p:spTree>
+      <p:nvGrpSpPr>
+        <p:cNvPr id="1" name=""/>
+        <p:cNvGrpSpPr/>
+        <p:nvPr/>
+      </p:nvGrpSpPr>
+      <p:grpSpPr>
+        <a:xfrm>
+          <a:off x="0" y="0"/>
+          <a:ext cx="0" cy="0"/>
+          <a:chOff x="0" y="0"/>
+          <a:chExt cx="0" cy="0"/>
+        </a:xfrm>
+      </p:grpSpPr>
+      <p:sp>
+        <p:nvSpPr>
+          <p:cNvPr id="2" name="Title 1">
+            <a:extLst>
+              <a:ext uri="{FF2B5EF4-FFF2-40B4-BE49-F238E27FC236}">
+                <a16:creationId xmlns:a16="http://schemas.microsoft.com/office/drawing/2014/main" id="{E6322AFA-4D04-C681-EDE8-D44A430AD12B}"/>
+              </a:ext>
+            </a:extLst>
+          </p:cNvPr>
+          <p:cNvSpPr>
+            <a:spLocks noGrp="1"/>
+          </p:cNvSpPr>
+          <p:nvPr>
+            <p:ph type="title"/>
+          </p:nvPr>
+        </p:nvSpPr>
+        <p:spPr>
+          <a:xfrm>
+            <a:off x="839788" y="457200"/>
+            <a:ext cx="3932237" cy="1600200"/>
+          </a:xfrm>
+        </p:spPr>
+        <p:txBody>
+          <a:bodyPr anchor="b"/>
+          <a:lstStyle>
+            <a:lvl1pPr>
+              <a:defRPr sz="3200"/>
+            </a:lvl1pPr>
+          </a:lstStyle>
+          <a:p>
+            <a:r>
+              <a:rPr lang="en-US"/>
+              <a:t>Click to edit Master title style</a:t>
+            </a:r>
+          </a:p>
+        </p:txBody>
+      </p:sp>
+      <p:sp>
+        <p:nvSpPr>
+          <p:cNvPr id="3" name="Content Placeholder 2">
+            <a:extLst>
+              <a:ext uri="{FF2B5EF4-FFF2-40B4-BE49-F238E27FC236}">
+                <a16:creationId xmlns:a16="http://schemas.microsoft.com/office/drawing/2014/main" id="{E959E544-DF47-362F-EB8E-988D57BE4260}"/>
+              </a:ext>
+            </a:extLst>
+          </p:cNvPr>
+          <p:cNvSpPr>
+            <a:spLocks noGrp="1"/>
+          </p:cNvSpPr>
+          <p:nvPr>
+            <p:ph idx="1"/>
+          </p:nvPr>
+        </p:nvSpPr>
+        <p:spPr>
+          <a:xfrm>
+            <a:off x="5183188" y="987425"/>
+            <a:ext cx="6172200" cy="4873625"/>
+          </a:xfrm>
+        </p:spPr>
+        <p:txBody>
+          <a:bodyPr/>
+          <a:lstStyle>
+            <a:lvl1pPr>
+              <a:defRPr sz="3200"/>
+            </a:lvl1pPr>
+            <a:lvl2pPr>
+              <a:defRPr sz="2800"/>
+            </a:lvl2pPr>
+            <a:lvl3pPr>
+              <a:defRPr sz="2400"/>
+            </a:lvl3pPr>
+            <a:lvl4pPr>
+              <a:defRPr sz="2000"/>
+            </a:lvl4pPr>
+            <a:lvl5pPr>
+              <a:defRPr sz="2000"/>
+            </a:lvl5pPr>
+            <a:lvl6pPr>
+              <a:defRPr sz="2000"/>
+            </a:lvl6pPr>
+            <a:lvl7pPr>
+              <a:defRPr sz="2000"/>
+            </a:lvl7pPr>
+            <a:lvl8pPr>
+              <a:defRPr sz="2000"/>
+            </a:lvl8pPr>
+            <a:lvl9pPr>
+              <a:defRPr sz="2000"/>
+            </a:lvl9pPr>
+          </a:lstStyle>
+          <a:p>
+            <a:pPr lvl="0"/>
+            <a:r>
+              <a:rPr lang="en-US"/>
+              <a:t>Click to edit Master text styles</a:t>
+            </a:r>
+          </a:p>
+          <a:p>
+            <a:pPr lvl="1"/>
+            <a:r>
+              <a:rPr lang="en-US"/>
+              <a:t>Second level</a:t>
+            </a:r>
+          </a:p>
+          <a:p>
+            <a:pPr lvl="2"/>
+            <a:r>
+              <a:rPr lang="en-US"/>
+              <a:t>Third level</a:t>
+            </a:r>
+          </a:p>
+          <a:p>
+            <a:pPr lvl="3"/>
+            <a:r>
+              <a:rPr lang="en-US"/>
+              <a:t>Fourth level</a:t>
+            </a:r>
+          </a:p>
+          <a:p>
+            <a:pPr lvl="4"/>
+            <a:r>
+              <a:rPr lang="en-US"/>
+              <a:t>Fifth level</a:t>
+            </a:r>
+          </a:p>
+        </p:txBody>
+      </p:sp>
+      <p:sp>
+        <p:nvSpPr>
+          <p:cNvPr id="4" name="Text Placeholder 3">
+            <a:extLst>
+              <a:ext uri="{FF2B5EF4-FFF2-40B4-BE49-F238E27FC236}">
+                <a16:creationId xmlns:a16="http://schemas.microsoft.com/office/drawing/2014/main" id="{778A5EEE-3A18-7DE7-AB98-C3F1BF104336}"/>
+              </a:ext>
+            </a:extLst>
+          </p:cNvPr>
+          <p:cNvSpPr>
+            <a:spLocks noGrp="1"/>
+          </p:cNvSpPr>
+          <p:nvPr>
+            <p:ph type="body" sz="half" idx="2"/>
+          </p:nvPr>
+        </p:nvSpPr>
+        <p:spPr>
+          <a:xfrm>
+            <a:off x="839788" y="2057400"/>
+            <a:ext cx="3932237" cy="3811588"/>
+          </a:xfrm>
+        </p:spPr>
+        <p:txBody>
+          <a:bodyPr/>
+          <a:lstStyle>
+            <a:lvl1pPr marL="0" indent="0">
+              <a:buNone/>
+              <a:defRPr sz="1600"/>
+            </a:lvl1pPr>
+            <a:lvl2pPr marL="457200" indent="0">
+              <a:buNone/>
+              <a:defRPr sz="1400"/>
+            </a:lvl2pPr>
+            <a:lvl3pPr marL="914400" indent="0">
+              <a:buNone/>
+              <a:defRPr sz="1200"/>
+            </a:lvl3pPr>
+            <a:lvl4pPr marL="1371600" indent="0">
+              <a:buNone/>
+              <a:defRPr sz="1000"/>
+            </a:lvl4pPr>
+            <a:lvl5pPr marL="1828800" indent="0">
+              <a:buNone/>
+              <a:defRPr sz="1000"/>
+            </a:lvl5pPr>
+            <a:lvl6pPr marL="2286000" indent="0">
+              <a:buNone/>
+              <a:defRPr sz="1000"/>
+            </a:lvl6pPr>
+            <a:lvl7pPr marL="2743200" indent="0">
+              <a:buNone/>
+              <a:defRPr sz="1000"/>
+            </a:lvl7pPr>
+            <a:lvl8pPr marL="3200400" indent="0">
+              <a:buNone/>
+              <a:defRPr sz="1000"/>
+            </a:lvl8pPr>
+            <a:lvl9pPr marL="3657600" indent="0">
+              <a:buNone/>
+              <a:defRPr sz="1000"/>
+            </a:lvl9pPr>
+          </a:lstStyle>
+          <a:p>
+            <a:pPr lvl="0"/>
+            <a:r>
+              <a:rPr lang="en-US"/>
+              <a:t>Click to edit Master text styles</a:t>
+            </a:r>
+          </a:p>
+        </p:txBody>
+      </p:sp>
+      <p:sp>
+        <p:nvSpPr>
+          <p:cNvPr id="5" name="Date Placeholder 4">
+            <a:extLst>
+              <a:ext uri="{FF2B5EF4-FFF2-40B4-BE49-F238E27FC236}">
+                <a16:creationId xmlns:a16="http://schemas.microsoft.com/office/drawing/2014/main" id="{5C9519F9-605C-5BD3-1B31-EC5FB683E1DF}"/>
+              </a:ext>
+            </a:extLst>
+          </p:cNvPr>
+          <p:cNvSpPr>
+            <a:spLocks noGrp="1"/>
+          </p:cNvSpPr>
+          <p:nvPr>
+            <p:ph type="dt" sz="half" idx="10"/>
+          </p:nvPr>
+        </p:nvSpPr>
+        <p:spPr/>
+        <p:txBody>
+          <a:bodyPr/>
+          <a:lstStyle/>
+          <a:p>
+            <a:fld id="{C764DE79-268F-4C1A-8933-263129D2AF90}" type="datetimeFigureOut">
+              <a:rPr lang="en-US" smtClean="0"/>
+              <a:t>12/30/2025</a:t>
+            </a:fld>
+            <a:endParaRPr lang="en-US" dirty="0"/>
+          </a:p>
+        </p:txBody>
+      </p:sp>
+      <p:sp>
+        <p:nvSpPr>
+          <p:cNvPr id="6" name="Footer Placeholder 5">
+            <a:extLst>
+              <a:ext uri="{FF2B5EF4-FFF2-40B4-BE49-F238E27FC236}">
+                <a16:creationId xmlns:a16="http://schemas.microsoft.com/office/drawing/2014/main" id="{ED52DC80-61F8-83A5-9F93-9C6DF2EFE489}"/>
+              </a:ext>
+            </a:extLst>
+          </p:cNvPr>
+          <p:cNvSpPr>
+            <a:spLocks noGrp="1"/>
+          </p:cNvSpPr>
+          <p:nvPr>
+            <p:ph type="ftr" sz="quarter" idx="11"/>
+          </p:nvPr>
+        </p:nvSpPr>
+        <p:spPr/>
+        <p:txBody>
+          <a:bodyPr/>
+          <a:lstStyle/>
+          <a:p>
+            <a:endParaRPr lang="en-US" dirty="0"/>
+          </a:p>
+        </p:txBody>
+      </p:sp>
+      <p:sp>
+        <p:nvSpPr>
+          <p:cNvPr id="7" name="Slide Number Placeholder 6">
+            <a:extLst>
+              <a:ext uri="{FF2B5EF4-FFF2-40B4-BE49-F238E27FC236}">
+                <a16:creationId xmlns:a16="http://schemas.microsoft.com/office/drawing/2014/main" id="{D4C66C16-7A8F-CB6F-575B-85D9632B08CB}"/>
+              </a:ext>
+            </a:extLst>
+          </p:cNvPr>
+          <p:cNvSpPr>
+            <a:spLocks noGrp="1"/>
+          </p:cNvSpPr>
+          <p:nvPr>
+            <p:ph type="sldNum" sz="quarter" idx="12"/>
+          </p:nvPr>
+        </p:nvSpPr>
+        <p:spPr/>
+        <p:txBody>
+          <a:bodyPr/>
+          <a:lstStyle/>
+          <a:p>
+            <a:fld id="{48F63A3B-78C7-47BE-AE5E-E10140E04643}" type="slidenum">
+              <a:rPr lang="en-US" smtClean="0"/>
+              <a:t>‹#›</a:t>
+            </a:fld>
+            <a:endParaRPr lang="en-US" dirty="0"/>
+          </a:p>
+        </p:txBody>
+      </p:sp>
+    </p:spTree>
+    <p:extLst>
+      <p:ext uri="{BB962C8B-B14F-4D97-AF65-F5344CB8AC3E}">
+        <p14:creationId xmlns:p14="http://schemas.microsoft.com/office/powerpoint/2010/main" val="3084452499"/>
+      </p:ext>
+    </p:extLst>
+  </p:cSld>
+  <p:clrMapOvr>
+    <a:masterClrMapping/>
+  </p:clrMapOvr>
+  <p:hf sldNum="0" hdr="0" ftr="0" dt="0"/>
+</p:sldLayout>
+</file>
+
+<file path=ppt/slideLayouts/slideLayout9.xml><?xml version="1.0" encoding="utf-8"?>
+<p:sldLayout xmlns:a="http://schemas.openxmlformats.org/drawingml/2006/main" xmlns:r="http://schemas.openxmlformats.org/officeDocument/2006/relationships" xmlns:p="http://schemas.openxmlformats.org/presentationml/2006/main" type="picTx" preserve="1">
+  <p:cSld name="Picture with Caption">
+    <p:spTree>
+      <p:nvGrpSpPr>
+        <p:cNvPr id="1" name=""/>
+        <p:cNvGrpSpPr/>
+        <p:nvPr/>
+      </p:nvGrpSpPr>
+      <p:grpSpPr>
+        <a:xfrm>
+          <a:off x="0" y="0"/>
+          <a:ext cx="0" cy="0"/>
+          <a:chOff x="0" y="0"/>
+          <a:chExt cx="0" cy="0"/>
+        </a:xfrm>
+      </p:grpSpPr>
+      <p:sp>
+        <p:nvSpPr>
+          <p:cNvPr id="2" name="Title 1">
+            <a:extLst>
+              <a:ext uri="{FF2B5EF4-FFF2-40B4-BE49-F238E27FC236}">
+                <a16:creationId xmlns:a16="http://schemas.microsoft.com/office/drawing/2014/main" id="{ECAED2AD-43F0-AD2E-8AD7-5AC988073E99}"/>
+              </a:ext>
+            </a:extLst>
+          </p:cNvPr>
+          <p:cNvSpPr>
+            <a:spLocks noGrp="1"/>
+          </p:cNvSpPr>
+          <p:nvPr>
+            <p:ph type="title"/>
+          </p:nvPr>
+        </p:nvSpPr>
+        <p:spPr>
+          <a:xfrm>
+            <a:off x="839788" y="457200"/>
+            <a:ext cx="3932237" cy="1600200"/>
+          </a:xfrm>
+        </p:spPr>
+        <p:txBody>
+          <a:bodyPr anchor="b"/>
+          <a:lstStyle>
+            <a:lvl1pPr>
+              <a:defRPr sz="3200"/>
+            </a:lvl1pPr>
+          </a:lstStyle>
+          <a:p>
+            <a:r>
+              <a:rPr lang="en-US"/>
+              <a:t>Click to edit Master title style</a:t>
+            </a:r>
+          </a:p>
+        </p:txBody>
+      </p:sp>
+      <p:sp>
+        <p:nvSpPr>
+          <p:cNvPr id="3" name="Picture Placeholder 2">
+            <a:extLst>
+              <a:ext uri="{FF2B5EF4-FFF2-40B4-BE49-F238E27FC236}">
+                <a16:creationId xmlns:a16="http://schemas.microsoft.com/office/drawing/2014/main" id="{4917426A-0C03-AB8A-6FAE-7F1CB2D848EF}"/>
+              </a:ext>
+            </a:extLst>
+          </p:cNvPr>
+          <p:cNvSpPr>
+            <a:spLocks noGrp="1"/>
+          </p:cNvSpPr>
+          <p:nvPr>
+            <p:ph type="pic" idx="1"/>
+          </p:nvPr>
+        </p:nvSpPr>
+        <p:spPr>
+          <a:xfrm>
+            <a:off x="5183188" y="987425"/>
+            <a:ext cx="6172200" cy="4873625"/>
+          </a:xfrm>
+        </p:spPr>
+        <p:txBody>
+          <a:bodyPr/>
+          <a:lstStyle>
+            <a:lvl1pPr marL="0" indent="0">
+              <a:buNone/>
+              <a:defRPr sz="3200"/>
+            </a:lvl1pPr>
+            <a:lvl2pPr marL="457200" indent="0">
+              <a:buNone/>
+              <a:defRPr sz="2800"/>
+            </a:lvl2pPr>
+            <a:lvl3pPr marL="914400" indent="0">
+              <a:buNone/>
+              <a:defRPr sz="2400"/>
+            </a:lvl3pPr>
+            <a:lvl4pPr marL="1371600" indent="0">
+              <a:buNone/>
+              <a:defRPr sz="2000"/>
+            </a:lvl4pPr>
+            <a:lvl5pPr marL="1828800" indent="0">
+              <a:buNone/>
+              <a:defRPr sz="2000"/>
+            </a:lvl5pPr>
+            <a:lvl6pPr marL="2286000" indent="0">
+              <a:buNone/>
+              <a:defRPr sz="2000"/>
+            </a:lvl6pPr>
+            <a:lvl7pPr marL="2743200" indent="0">
+              <a:buNone/>
+              <a:defRPr sz="2000"/>
+            </a:lvl7pPr>
+            <a:lvl8pPr marL="3200400" indent="0">
+              <a:buNone/>
+              <a:defRPr sz="2000"/>
+            </a:lvl8pPr>
+            <a:lvl9pPr marL="3657600" indent="0">
+              <a:buNone/>
+              <a:defRPr sz="2000"/>
+            </a:lvl9pPr>
+          </a:lstStyle>
+          <a:p>
+            <a:endParaRPr lang="en-US"/>
+          </a:p>
+        </p:txBody>
+      </p:sp>
+      <p:sp>
+        <p:nvSpPr>
+          <p:cNvPr id="4" name="Text Placeholder 3">
+            <a:extLst>
+              <a:ext uri="{FF2B5EF4-FFF2-40B4-BE49-F238E27FC236}">
+                <a16:creationId xmlns:a16="http://schemas.microsoft.com/office/drawing/2014/main" id="{BBEBADC7-FD85-6B2B-0EAE-8FC793826571}"/>
+              </a:ext>
+            </a:extLst>
+          </p:cNvPr>
+          <p:cNvSpPr>
+            <a:spLocks noGrp="1"/>
+          </p:cNvSpPr>
+          <p:nvPr>
+            <p:ph type="body" sz="half" idx="2"/>
+          </p:nvPr>
+        </p:nvSpPr>
+        <p:spPr>
+          <a:xfrm>
+            <a:off x="839788" y="2057400"/>
+            <a:ext cx="3932237" cy="3811588"/>
+          </a:xfrm>
+        </p:spPr>
+        <p:txBody>
+          <a:bodyPr/>
+          <a:lstStyle>
+            <a:lvl1pPr marL="0" indent="0">
+              <a:buNone/>
+              <a:defRPr sz="1600"/>
+            </a:lvl1pPr>
+            <a:lvl2pPr marL="457200" indent="0">
+              <a:buNone/>
+              <a:defRPr sz="1400"/>
+            </a:lvl2pPr>
+            <a:lvl3pPr marL="914400" indent="0">
+              <a:buNone/>
+              <a:defRPr sz="1200"/>
+            </a:lvl3pPr>
+            <a:lvl4pPr marL="1371600" indent="0">
+              <a:buNone/>
+              <a:defRPr sz="1000"/>
+            </a:lvl4pPr>
+            <a:lvl5pPr marL="1828800" indent="0">
+              <a:buNone/>
+              <a:defRPr sz="1000"/>
+            </a:lvl5pPr>
+            <a:lvl6pPr marL="2286000" indent="0">
+              <a:buNone/>
+              <a:defRPr sz="1000"/>
+            </a:lvl6pPr>
+            <a:lvl7pPr marL="2743200" indent="0">
+              <a:buNone/>
+              <a:defRPr sz="1000"/>
+            </a:lvl7pPr>
+            <a:lvl8pPr marL="3200400" indent="0">
+              <a:buNone/>
+              <a:defRPr sz="1000"/>
+            </a:lvl8pPr>
+            <a:lvl9pPr marL="3657600" indent="0">
+              <a:buNone/>
+              <a:defRPr sz="1000"/>
+            </a:lvl9pPr>
+          </a:lstStyle>
+          <a:p>
+            <a:pPr lvl="0"/>
+            <a:r>
+              <a:rPr lang="en-US"/>
+              <a:t>Click to edit Master text styles</a:t>
+            </a:r>
+          </a:p>
+        </p:txBody>
+      </p:sp>
+      <p:sp>
+        <p:nvSpPr>
+          <p:cNvPr id="5" name="Date Placeholder 4">
+            <a:extLst>
+              <a:ext uri="{FF2B5EF4-FFF2-40B4-BE49-F238E27FC236}">
+                <a16:creationId xmlns:a16="http://schemas.microsoft.com/office/drawing/2014/main" id="{4D725D65-CB1A-9F08-018E-39E428F1B684}"/>
+              </a:ext>
+            </a:extLst>
+          </p:cNvPr>
+          <p:cNvSpPr>
+            <a:spLocks noGrp="1"/>
+          </p:cNvSpPr>
+          <p:nvPr>
+            <p:ph type="dt" sz="half" idx="10"/>
+          </p:nvPr>
+        </p:nvSpPr>
+        <p:spPr/>
+        <p:txBody>
+          <a:bodyPr/>
+          <a:lstStyle/>
+          <a:p>
+            <a:fld id="{C764DE79-268F-4C1A-8933-263129D2AF90}" type="datetimeFigureOut">
+              <a:rPr lang="en-US" smtClean="0"/>
+              <a:t>12/30/2025</a:t>
+            </a:fld>
+            <a:endParaRPr lang="en-US" dirty="0"/>
+          </a:p>
+        </p:txBody>
+      </p:sp>
+      <p:sp>
+        <p:nvSpPr>
+          <p:cNvPr id="6" name="Footer Placeholder 5">
+            <a:extLst>
+              <a:ext uri="{FF2B5EF4-FFF2-40B4-BE49-F238E27FC236}">
+                <a16:creationId xmlns:a16="http://schemas.microsoft.com/office/drawing/2014/main" id="{495968CA-20A9-C917-C3BC-3C97C47C5DDB}"/>
+              </a:ext>
+            </a:extLst>
+          </p:cNvPr>
+          <p:cNvSpPr>
+            <a:spLocks noGrp="1"/>
+          </p:cNvSpPr>
+          <p:nvPr>
+            <p:ph type="ftr" sz="quarter" idx="11"/>
+          </p:nvPr>
+        </p:nvSpPr>
+        <p:spPr/>
+        <p:txBody>
+          <a:bodyPr/>
+          <a:lstStyle/>
+          <a:p>
+            <a:endParaRPr lang="en-US" dirty="0"/>
+          </a:p>
+        </p:txBody>
+      </p:sp>
+      <p:sp>
+        <p:nvSpPr>
+          <p:cNvPr id="7" name="Slide Number Placeholder 6">
+            <a:extLst>
+              <a:ext uri="{FF2B5EF4-FFF2-40B4-BE49-F238E27FC236}">
+                <a16:creationId xmlns:a16="http://schemas.microsoft.com/office/drawing/2014/main" id="{AE248D56-BFB6-4074-10BE-25B4891BA919}"/>
+              </a:ext>
+            </a:extLst>
+          </p:cNvPr>
+          <p:cNvSpPr>
+            <a:spLocks noGrp="1"/>
+          </p:cNvSpPr>
+          <p:nvPr>
+            <p:ph type="sldNum" sz="quarter" idx="12"/>
+          </p:nvPr>
+        </p:nvSpPr>
+        <p:spPr/>
+        <p:txBody>
+          <a:bodyPr/>
+          <a:lstStyle/>
+          <a:p>
+            <a:fld id="{48F63A3B-78C7-47BE-AE5E-E10140E04643}" type="slidenum">
+              <a:rPr lang="en-US" smtClean="0"/>
+              <a:t>‹#›</a:t>
+            </a:fld>
+            <a:endParaRPr lang="en-US" dirty="0"/>
+          </a:p>
+        </p:txBody>
+      </p:sp>
+    </p:spTree>
+    <p:extLst>
+      <p:ext uri="{BB962C8B-B14F-4D97-AF65-F5344CB8AC3E}">
+        <p14:creationId xmlns:p14="http://schemas.microsoft.com/office/powerpoint/2010/main" val="53070517"/>
+      </p:ext>
+    </p:extLst>
+  </p:cSld>
+  <p:clrMapOvr>
+    <a:masterClrMapping/>
+  </p:clrMapOvr>
+  <p:hf sldNum="0" hdr="0" ftr="0" dt="0"/>
+</p:sldLayout>
+</file>
+
+<file path=ppt/slideMasters/slideMaster1.xml><?xml version="1.0" encoding="utf-8"?>
+<p:sldMaster xmlns:a="http://schemas.openxmlformats.org/drawingml/2006/main" xmlns:r="http://schemas.openxmlformats.org/officeDocument/2006/relationships" xmlns:p="http://schemas.openxmlformats.org/presentationml/2006/main">
+  <p:cSld>
+    <p:bg>
+      <p:bgRef idx="1001">
+        <a:schemeClr val="bg1"/>
+      </p:bgRef>
+    </p:bg>
+    <p:spTree>
+      <p:nvGrpSpPr>
+        <p:cNvPr id="1" name=""/>
+        <p:cNvGrpSpPr/>
+        <p:nvPr/>
+      </p:nvGrpSpPr>
+      <p:grpSpPr>
+        <a:xfrm>
+          <a:off x="0" y="0"/>
+          <a:ext cx="0" cy="0"/>
+          <a:chOff x="0" y="0"/>
+          <a:chExt cx="0" cy="0"/>
+        </a:xfrm>
+      </p:grpSpPr>
+      <p:sp>
+        <p:nvSpPr>
+          <p:cNvPr id="2" name="Title Placeholder 1">
+            <a:extLst>
+              <a:ext uri="{FF2B5EF4-FFF2-40B4-BE49-F238E27FC236}">
+                <a16:creationId xmlns:a16="http://schemas.microsoft.com/office/drawing/2014/main" id="{7D70E1F2-90F0-C7F9-B04F-E2F2D8FFBD6D}"/>
+              </a:ext>
+            </a:extLst>
+          </p:cNvPr>
+          <p:cNvSpPr>
+            <a:spLocks noGrp="1"/>
+          </p:cNvSpPr>
+          <p:nvPr>
+            <p:ph type="title"/>
+          </p:nvPr>
+        </p:nvSpPr>
+        <p:spPr>
+          <a:xfrm>
+            <a:off x="838200" y="365125"/>
+            <a:ext cx="10515600" cy="1325563"/>
+          </a:xfrm>
+          <a:prstGeom prst="rect">
+            <a:avLst/>
+          </a:prstGeom>
+        </p:spPr>
+        <p:txBody>
+          <a:bodyPr vert="horz" lIns="91440" tIns="45720" rIns="91440" bIns="45720" rtlCol="0" anchor="ctr">
+            <a:normAutofit/>
+          </a:bodyPr>
+          <a:lstStyle/>
+          <a:p>
+            <a:r>
+              <a:rPr lang="en-US"/>
+              <a:t>Click to edit Master title style</a:t>
+            </a:r>
+          </a:p>
+        </p:txBody>
+      </p:sp>
+      <p:sp>
+        <p:nvSpPr>
+          <p:cNvPr id="3" name="Text Placeholder 2">
+            <a:extLst>
+              <a:ext uri="{FF2B5EF4-FFF2-40B4-BE49-F238E27FC236}">
+                <a16:creationId xmlns:a16="http://schemas.microsoft.com/office/drawing/2014/main" id="{93EF29D4-A301-48D8-2780-AC3685E77493}"/>
+              </a:ext>
+            </a:extLst>
+          </p:cNvPr>
+          <p:cNvSpPr>
+            <a:spLocks noGrp="1"/>
+          </p:cNvSpPr>
+          <p:nvPr>
+            <p:ph type="body" idx="1"/>
+          </p:nvPr>
+        </p:nvSpPr>
+        <p:spPr>
+          <a:xfrm>
+            <a:off x="838200" y="1825625"/>
+            <a:ext cx="10515600" cy="4351338"/>
+          </a:xfrm>
+          <a:prstGeom prst="rect">
+            <a:avLst/>
+          </a:prstGeom>
+        </p:spPr>
+        <p:txBody>
+          <a:bodyPr vert="horz" lIns="91440" tIns="45720" rIns="91440" bIns="45720" rtlCol="0">
+            <a:normAutofit/>
+          </a:bodyPr>
+          <a:lstStyle/>
+          <a:p>
+            <a:pPr lvl="0"/>
+            <a:r>
+              <a:rPr lang="en-US"/>
+              <a:t>Click to edit Master text styles</a:t>
+            </a:r>
+          </a:p>
+          <a:p>
+            <a:pPr lvl="1"/>
+            <a:r>
+              <a:rPr lang="en-US"/>
+              <a:t>Second level</a:t>
+            </a:r>
+          </a:p>
+          <a:p>
+            <a:pPr lvl="2"/>
+            <a:r>
+              <a:rPr lang="en-US"/>
+              <a:t>Third level</a:t>
+            </a:r>
+          </a:p>
+          <a:p>
+            <a:pPr lvl="3"/>
+            <a:r>
+              <a:rPr lang="en-US"/>
+              <a:t>Fourth level</a:t>
+            </a:r>
+          </a:p>
+          <a:p>
+            <a:pPr lvl="4"/>
+            <a:r>
+              <a:rPr lang="en-US"/>
+              <a:t>Fifth level</a:t>
+            </a:r>
+          </a:p>
+        </p:txBody>
+      </p:sp>
+      <p:sp>
+        <p:nvSpPr>
+          <p:cNvPr id="4" name="Date Placeholder 3">
+            <a:extLst>
+              <a:ext uri="{FF2B5EF4-FFF2-40B4-BE49-F238E27FC236}">
+                <a16:creationId xmlns:a16="http://schemas.microsoft.com/office/drawing/2014/main" id="{F466B1E1-2E90-7264-4E62-49542540B080}"/>
+              </a:ext>
+            </a:extLst>
+          </p:cNvPr>
+          <p:cNvSpPr>
+            <a:spLocks noGrp="1"/>
+          </p:cNvSpPr>
+          <p:nvPr>
+            <p:ph type="dt" sz="half" idx="2"/>
+          </p:nvPr>
+        </p:nvSpPr>
+        <p:spPr>
+          <a:xfrm>
+            <a:off x="838200" y="6356350"/>
+            <a:ext cx="2743200" cy="365125"/>
+          </a:xfrm>
+          <a:prstGeom prst="rect">
+            <a:avLst/>
+          </a:prstGeom>
+        </p:spPr>
+        <p:txBody>
+          <a:bodyPr vert="horz" lIns="91440" tIns="45720" rIns="91440" bIns="45720" rtlCol="0" anchor="ctr"/>
+          <a:lstStyle>
+            <a:lvl1pPr algn="l">
+              <a:defRPr sz="1200">
+                <a:solidFill>
+                  <a:schemeClr val="tx1">
+                    <a:tint val="75000"/>
+                  </a:schemeClr>
+                </a:solidFill>
+              </a:defRPr>
+            </a:lvl1pPr>
+          </a:lstStyle>
+          <a:p>
+            <a:fld id="{C764DE79-268F-4C1A-8933-263129D2AF90}" type="datetimeFigureOut">
+              <a:rPr lang="en-US" smtClean="0"/>
+              <a:t>12/30/2025</a:t>
+            </a:fld>
+            <a:endParaRPr lang="en-US" dirty="0"/>
+          </a:p>
+        </p:txBody>
+      </p:sp>
+      <p:sp>
+        <p:nvSpPr>
+          <p:cNvPr id="5" name="Footer Placeholder 4">
+            <a:extLst>
+              <a:ext uri="{FF2B5EF4-FFF2-40B4-BE49-F238E27FC236}">
+                <a16:creationId xmlns:a16="http://schemas.microsoft.com/office/drawing/2014/main" id="{5B07CDFA-5615-D761-C9CE-007770A6A9CC}"/>
+              </a:ext>
+            </a:extLst>
+          </p:cNvPr>
+          <p:cNvSpPr>
+            <a:spLocks noGrp="1"/>
+          </p:cNvSpPr>
+          <p:nvPr>
+            <p:ph type="ftr" sz="quarter" idx="3"/>
+          </p:nvPr>
+        </p:nvSpPr>
+        <p:spPr>
+          <a:xfrm>
+            <a:off x="4038600" y="6356350"/>
+            <a:ext cx="4114800" cy="365125"/>
+          </a:xfrm>
+          <a:prstGeom prst="rect">
+            <a:avLst/>
+          </a:prstGeom>
+        </p:spPr>
+        <p:txBody>
+          <a:bodyPr vert="horz" lIns="91440" tIns="45720" rIns="91440" bIns="45720" rtlCol="0" anchor="ctr"/>
+          <a:lstStyle>
+            <a:lvl1pPr algn="ctr">
+              <a:defRPr sz="1200">
+                <a:solidFill>
+                  <a:schemeClr val="tx1">
+                    <a:tint val="75000"/>
+                  </a:schemeClr>
+                </a:solidFill>
+              </a:defRPr>
+            </a:lvl1pPr>
+          </a:lstStyle>
+          <a:p>
+            <a:endParaRPr lang="en-US" dirty="0"/>
+          </a:p>
+        </p:txBody>
+      </p:sp>
+      <p:sp>
+        <p:nvSpPr>
+          <p:cNvPr id="6" name="Slide Number Placeholder 5">
+            <a:extLst>
+              <a:ext uri="{FF2B5EF4-FFF2-40B4-BE49-F238E27FC236}">
+                <a16:creationId xmlns:a16="http://schemas.microsoft.com/office/drawing/2014/main" id="{0950DFA4-A9B0-EEC0-421D-11A7BEB978AC}"/>
+              </a:ext>
+            </a:extLst>
+          </p:cNvPr>
+          <p:cNvSpPr>
+            <a:spLocks noGrp="1"/>
+          </p:cNvSpPr>
+          <p:nvPr>
+            <p:ph type="sldNum" sz="quarter" idx="4"/>
+          </p:nvPr>
+        </p:nvSpPr>
+        <p:spPr>
+          <a:xfrm>
+            <a:off x="8610600" y="6356350"/>
+            <a:ext cx="2743200" cy="365125"/>
+          </a:xfrm>
+          <a:prstGeom prst="rect">
+            <a:avLst/>
+          </a:prstGeom>
+        </p:spPr>
+        <p:txBody>
+          <a:bodyPr vert="horz" lIns="91440" tIns="45720" rIns="91440" bIns="45720" rtlCol="0" anchor="ctr"/>
+          <a:lstStyle>
+            <a:lvl1pPr algn="r">
+              <a:defRPr sz="1200">
+                <a:solidFill>
+                  <a:schemeClr val="tx1">
+                    <a:tint val="75000"/>
+                  </a:schemeClr>
+                </a:solidFill>
+              </a:defRPr>
+            </a:lvl1pPr>
+          </a:lstStyle>
+          <a:p>
+            <a:fld id="{48F63A3B-78C7-47BE-AE5E-E10140E04643}" type="slidenum">
+              <a:rPr lang="en-US" smtClean="0"/>
+              <a:t>‹#›</a:t>
+            </a:fld>
+            <a:endParaRPr lang="en-US" dirty="0"/>
+          </a:p>
+        </p:txBody>
+      </p:sp>
+    </p:spTree>
+    <p:extLst>
+      <p:ext uri="{BB962C8B-B14F-4D97-AF65-F5344CB8AC3E}">
+        <p14:creationId xmlns:p14="http://schemas.microsoft.com/office/powerpoint/2010/main" val="2793186616"/>
+      </p:ext>
+    </p:extLst>
   </p:cSld>
   <p:clrMap bg1="lt1" tx1="dk1" bg2="lt2" tx2="dk2" accent1="accent1" accent2="accent2" accent3="accent3" accent4="accent4" accent5="accent5" accent6="accent6" hlink="hlink" folHlink="folHlink"/>
   <p:sldLayoutIdLst>
-    <p:sldLayoutId id="2147483649" r:id="rId1"/>
+    <p:sldLayoutId id="2147483677" r:id="rId1"/>
+    <p:sldLayoutId id="2147483678" r:id="rId2"/>
+    <p:sldLayoutId id="2147483679" r:id="rId3"/>
+    <p:sldLayoutId id="2147483680" r:id="rId4"/>
+    <p:sldLayoutId id="2147483681" r:id="rId5"/>
+    <p:sldLayoutId id="2147483682" r:id="rId6"/>
+    <p:sldLayoutId id="2147483683" r:id="rId7"/>
+    <p:sldLayoutId id="2147483684" r:id="rId8"/>
+    <p:sldLayoutId id="2147483685" r:id="rId9"/>
+    <p:sldLayoutId id="2147483686" r:id="rId10"/>
+    <p:sldLayoutId id="2147483687" r:id="rId11"/>
+    <p:sldLayoutId id="2147483688" r:id="rId12"/>
   </p:sldLayoutIdLst>
   <p:hf sldNum="0" hdr="0" ftr="0" dt="0"/>
   <p:txStyles>
     <p:titleStyle>
-      <a:lvl1pPr algn="ctr" defTabSz="914400" rtl="0" eaLnBrk="1" latinLnBrk="0" hangingPunct="1">
+      <a:lvl1pPr algn="l" defTabSz="914400" rtl="0" eaLnBrk="1" latinLnBrk="0" hangingPunct="1">
+        <a:lnSpc>
+          <a:spcPct val="90000"/>
+        </a:lnSpc>
         <a:spcBef>
           <a:spcPct val="0"/>
         </a:spcBef>
@@ -3464,13 +6027,16 @@
       </a:lvl1pPr>
     </p:titleStyle>
     <p:bodyStyle>
-      <a:lvl1pPr marL="342900" indent="-342900" algn="l" defTabSz="914400" rtl="0" eaLnBrk="1" latinLnBrk="0" hangingPunct="1">
+      <a:lvl1pPr marL="228600" indent="-228600" algn="l" defTabSz="914400" rtl="0" eaLnBrk="1" latinLnBrk="0" hangingPunct="1">
+        <a:lnSpc>
+          <a:spcPct val="90000"/>
+        </a:lnSpc>
         <a:spcBef>
-          <a:spcPct val="20000"/>
+          <a:spcPts val="1000"/>
         </a:spcBef>
-        <a:buFont typeface="Arial" pitchFamily="34" charset="0"/>
+        <a:buFont typeface="Arial" panose="020B0604020202020204" pitchFamily="34" charset="0"/>
         <a:buChar char="•"/>
-        <a:defRPr sz="3200" kern="1200">
+        <a:defRPr sz="2800" kern="1200">
           <a:solidFill>
             <a:schemeClr val="tx1"/>
           </a:solidFill>
@@ -3479,13 +6045,16 @@
           <a:cs typeface="+mn-cs"/>
         </a:defRPr>
       </a:lvl1pPr>
-      <a:lvl2pPr marL="742950" indent="-285750" algn="l" defTabSz="914400" rtl="0" eaLnBrk="1" latinLnBrk="0" hangingPunct="1">
+      <a:lvl2pPr marL="685800" indent="-228600" algn="l" defTabSz="914400" rtl="0" eaLnBrk="1" latinLnBrk="0" hangingPunct="1">
+        <a:lnSpc>
+          <a:spcPct val="90000"/>
+        </a:lnSpc>
         <a:spcBef>
-          <a:spcPct val="20000"/>
+          <a:spcPts val="500"/>
         </a:spcBef>
-        <a:buFont typeface="Arial" pitchFamily="34" charset="0"/>
-        <a:buChar char="–"/>
-        <a:defRPr sz="2800" kern="1200">
+        <a:buFont typeface="Arial" panose="020B0604020202020204" pitchFamily="34" charset="0"/>
+        <a:buChar char="•"/>
+        <a:defRPr sz="2400" kern="1200">
           <a:solidFill>
             <a:schemeClr val="tx1"/>
           </a:solidFill>
@@ -3495,12 +6064,15 @@
         </a:defRPr>
       </a:lvl2pPr>
       <a:lvl3pPr marL="1143000" indent="-228600" algn="l" defTabSz="914400" rtl="0" eaLnBrk="1" latinLnBrk="0" hangingPunct="1">
+        <a:lnSpc>
+          <a:spcPct val="90000"/>
+        </a:lnSpc>
         <a:spcBef>
-          <a:spcPct val="20000"/>
+          <a:spcPts val="500"/>
         </a:spcBef>
-        <a:buFont typeface="Arial" pitchFamily="34" charset="0"/>
+        <a:buFont typeface="Arial" panose="020B0604020202020204" pitchFamily="34" charset="0"/>
         <a:buChar char="•"/>
-        <a:defRPr sz="2400" kern="1200">
+        <a:defRPr sz="2000" kern="1200">
           <a:solidFill>
             <a:schemeClr val="tx1"/>
           </a:solidFill>
@@ -3510,12 +6082,15 @@
         </a:defRPr>
       </a:lvl3pPr>
       <a:lvl4pPr marL="1600200" indent="-228600" algn="l" defTabSz="914400" rtl="0" eaLnBrk="1" latinLnBrk="0" hangingPunct="1">
+        <a:lnSpc>
+          <a:spcPct val="90000"/>
+        </a:lnSpc>
         <a:spcBef>
-          <a:spcPct val="20000"/>
+          <a:spcPts val="500"/>
         </a:spcBef>
-        <a:buFont typeface="Arial" pitchFamily="34" charset="0"/>
-        <a:buChar char="–"/>
-        <a:defRPr sz="2000" kern="1200">
+        <a:buFont typeface="Arial" panose="020B0604020202020204" pitchFamily="34" charset="0"/>
+        <a:buChar char="•"/>
+        <a:defRPr sz="1800" kern="1200">
           <a:solidFill>
             <a:schemeClr val="tx1"/>
           </a:solidFill>
@@ -3525,12 +6100,15 @@
         </a:defRPr>
       </a:lvl4pPr>
       <a:lvl5pPr marL="2057400" indent="-228600" algn="l" defTabSz="914400" rtl="0" eaLnBrk="1" latinLnBrk="0" hangingPunct="1">
+        <a:lnSpc>
+          <a:spcPct val="90000"/>
+        </a:lnSpc>
         <a:spcBef>
-          <a:spcPct val="20000"/>
+          <a:spcPts val="500"/>
         </a:spcBef>
-        <a:buFont typeface="Arial" pitchFamily="34" charset="0"/>
-        <a:buChar char="»"/>
-        <a:defRPr sz="2000" kern="1200">
+        <a:buFont typeface="Arial" panose="020B0604020202020204" pitchFamily="34" charset="0"/>
+        <a:buChar char="•"/>
+        <a:defRPr sz="1800" kern="1200">
           <a:solidFill>
             <a:schemeClr val="tx1"/>
           </a:solidFill>
@@ -3540,12 +6118,15 @@
         </a:defRPr>
       </a:lvl5pPr>
       <a:lvl6pPr marL="2514600" indent="-228600" algn="l" defTabSz="914400" rtl="0" eaLnBrk="1" latinLnBrk="0" hangingPunct="1">
+        <a:lnSpc>
+          <a:spcPct val="90000"/>
+        </a:lnSpc>
         <a:spcBef>
-          <a:spcPct val="20000"/>
+          <a:spcPts val="500"/>
         </a:spcBef>
-        <a:buFont typeface="Arial" pitchFamily="34" charset="0"/>
+        <a:buFont typeface="Arial" panose="020B0604020202020204" pitchFamily="34" charset="0"/>
         <a:buChar char="•"/>
-        <a:defRPr sz="2000" kern="1200">
+        <a:defRPr sz="1800" kern="1200">
           <a:solidFill>
             <a:schemeClr val="tx1"/>
           </a:solidFill>
@@ -3555,12 +6136,15 @@
         </a:defRPr>
       </a:lvl6pPr>
       <a:lvl7pPr marL="2971800" indent="-228600" algn="l" defTabSz="914400" rtl="0" eaLnBrk="1" latinLnBrk="0" hangingPunct="1">
+        <a:lnSpc>
+          <a:spcPct val="90000"/>
+        </a:lnSpc>
         <a:spcBef>
-          <a:spcPct val="20000"/>
+          <a:spcPts val="500"/>
         </a:spcBef>
-        <a:buFont typeface="Arial" pitchFamily="34" charset="0"/>
+        <a:buFont typeface="Arial" panose="020B0604020202020204" pitchFamily="34" charset="0"/>
         <a:buChar char="•"/>
-        <a:defRPr sz="2000" kern="1200">
+        <a:defRPr sz="1800" kern="1200">
           <a:solidFill>
             <a:schemeClr val="tx1"/>
           </a:solidFill>
@@ -3570,12 +6154,15 @@
         </a:defRPr>
       </a:lvl7pPr>
       <a:lvl8pPr marL="3429000" indent="-228600" algn="l" defTabSz="914400" rtl="0" eaLnBrk="1" latinLnBrk="0" hangingPunct="1">
+        <a:lnSpc>
+          <a:spcPct val="90000"/>
+        </a:lnSpc>
         <a:spcBef>
-          <a:spcPct val="20000"/>
+          <a:spcPts val="500"/>
         </a:spcBef>
-        <a:buFont typeface="Arial" pitchFamily="34" charset="0"/>
+        <a:buFont typeface="Arial" panose="020B0604020202020204" pitchFamily="34" charset="0"/>
         <a:buChar char="•"/>
-        <a:defRPr sz="2000" kern="1200">
+        <a:defRPr sz="1800" kern="1200">
           <a:solidFill>
             <a:schemeClr val="tx1"/>
           </a:solidFill>
@@ -3585,12 +6172,15 @@
         </a:defRPr>
       </a:lvl8pPr>
       <a:lvl9pPr marL="3886200" indent="-228600" algn="l" defTabSz="914400" rtl="0" eaLnBrk="1" latinLnBrk="0" hangingPunct="1">
+        <a:lnSpc>
+          <a:spcPct val="90000"/>
+        </a:lnSpc>
         <a:spcBef>
-          <a:spcPct val="20000"/>
+          <a:spcPts val="500"/>
         </a:spcBef>
-        <a:buFont typeface="Arial" pitchFamily="34" charset="0"/>
+        <a:buFont typeface="Arial" panose="020B0604020202020204" pitchFamily="34" charset="0"/>
         <a:buChar char="•"/>
-        <a:defRPr sz="2000" kern="1200">
+        <a:defRPr sz="1800" kern="1200">
           <a:solidFill>
             <a:schemeClr val="tx1"/>
           </a:solidFill>
@@ -3705,7 +6295,7 @@
     <p:bg>
       <p:bgPr>
         <a:blipFill dpi="0" rotWithShape="1">
-          <a:blip r:embed="rId1">
+          <a:blip r:embed="rId3">
             <a:lum/>
           </a:blip>
           <a:srcRect/>
@@ -3744,7 +6334,7 @@
     <p:bg>
       <p:bgPr>
         <a:blipFill dpi="0" rotWithShape="1">
-          <a:blip r:embed="rId1">
+          <a:blip r:embed="rId3">
             <a:lum/>
           </a:blip>
           <a:srcRect/>
@@ -3783,7 +6373,7 @@
     <p:bg>
       <p:bgPr>
         <a:blipFill dpi="0" rotWithShape="1">
-          <a:blip r:embed="rId1">
+          <a:blip r:embed="rId3">
             <a:lum/>
           </a:blip>
           <a:srcRect/>
@@ -3822,7 +6412,7 @@
     <p:bg>
       <p:bgPr>
         <a:blipFill dpi="0" rotWithShape="1">
-          <a:blip r:embed="rId1">
+          <a:blip r:embed="rId3">
             <a:lum/>
           </a:blip>
           <a:srcRect/>
@@ -3861,7 +6451,7 @@
     <p:bg>
       <p:bgPr>
         <a:blipFill dpi="0" rotWithShape="1">
-          <a:blip r:embed="rId1">
+          <a:blip r:embed="rId3">
             <a:lum/>
           </a:blip>
           <a:srcRect/>
@@ -3900,7 +6490,7 @@
     <p:bg>
       <p:bgPr>
         <a:blipFill dpi="0" rotWithShape="1">
-          <a:blip r:embed="rId1">
+          <a:blip r:embed="rId3">
             <a:lum/>
           </a:blip>
           <a:srcRect/>
@@ -3939,7 +6529,7 @@
     <p:bg>
       <p:bgPr>
         <a:blipFill dpi="0" rotWithShape="1">
-          <a:blip r:embed="rId1">
+          <a:blip r:embed="rId3">
             <a:lum/>
           </a:blip>
           <a:srcRect/>
@@ -3978,7 +6568,7 @@
     <p:bg>
       <p:bgPr>
         <a:blipFill dpi="0" rotWithShape="1">
-          <a:blip r:embed="rId1">
+          <a:blip r:embed="rId3">
             <a:lum/>
           </a:blip>
           <a:srcRect/>
@@ -4017,7 +6607,7 @@
     <p:bg>
       <p:bgPr>
         <a:blipFill dpi="0" rotWithShape="1">
-          <a:blip r:embed="rId1">
+          <a:blip r:embed="rId3">
             <a:lum/>
           </a:blip>
           <a:srcRect/>
@@ -4056,7 +6646,7 @@
     <p:bg>
       <p:bgPr>
         <a:blipFill dpi="0" rotWithShape="1">
-          <a:blip r:embed="rId1">
+          <a:blip r:embed="rId3">
             <a:lum/>
           </a:blip>
           <a:srcRect/>
@@ -4095,7 +6685,7 @@
     <p:bg>
       <p:bgPr>
         <a:blipFill dpi="0" rotWithShape="1">
-          <a:blip r:embed="rId1">
+          <a:blip r:embed="rId3">
             <a:lum/>
           </a:blip>
           <a:srcRect/>
@@ -4134,7 +6724,7 @@
     <p:bg>
       <p:bgPr>
         <a:blipFill dpi="0" rotWithShape="1">
-          <a:blip r:embed="rId1">
+          <a:blip r:embed="rId3">
             <a:lum/>
           </a:blip>
           <a:srcRect/>
@@ -4173,7 +6763,7 @@
     <p:bg>
       <p:bgPr>
         <a:blipFill dpi="0" rotWithShape="1">
-          <a:blip r:embed="rId1">
+          <a:blip r:embed="rId3">
             <a:lum/>
           </a:blip>
           <a:srcRect/>
@@ -4212,7 +6802,7 @@
     <p:bg>
       <p:bgPr>
         <a:blipFill dpi="0" rotWithShape="1">
-          <a:blip r:embed="rId1">
+          <a:blip r:embed="rId3">
             <a:lum/>
           </a:blip>
           <a:srcRect/>
@@ -4251,7 +6841,7 @@
     <p:bg>
       <p:bgPr>
         <a:blipFill dpi="0" rotWithShape="1">
-          <a:blip r:embed="rId1">
+          <a:blip r:embed="rId3">
             <a:lum/>
           </a:blip>
           <a:srcRect/>
@@ -4290,7 +6880,7 @@
     <p:bg>
       <p:bgPr>
         <a:blipFill dpi="0" rotWithShape="1">
-          <a:blip r:embed="rId1">
+          <a:blip r:embed="rId3">
             <a:lum/>
           </a:blip>
           <a:srcRect/>
@@ -4329,7 +6919,7 @@
     <p:bg>
       <p:bgPr>
         <a:blipFill dpi="0" rotWithShape="1">
-          <a:blip r:embed="rId1">
+          <a:blip r:embed="rId3">
             <a:lum/>
           </a:blip>
           <a:srcRect/>
@@ -4368,7 +6958,7 @@
     <p:bg>
       <p:bgPr>
         <a:blipFill dpi="0" rotWithShape="1">
-          <a:blip r:embed="rId1">
+          <a:blip r:embed="rId3">
             <a:lum/>
           </a:blip>
           <a:srcRect/>
@@ -4407,7 +6997,7 @@
     <p:bg>
       <p:bgPr>
         <a:blipFill dpi="0" rotWithShape="1">
-          <a:blip r:embed="rId1">
+          <a:blip r:embed="rId3">
             <a:lum/>
           </a:blip>
           <a:srcRect/>
@@ -4446,7 +7036,7 @@
     <p:bg>
       <p:bgPr>
         <a:blipFill dpi="0" rotWithShape="1">
-          <a:blip r:embed="rId1">
+          <a:blip r:embed="rId3">
             <a:lum/>
           </a:blip>
           <a:srcRect/>
@@ -4485,7 +7075,7 @@
     <p:bg>
       <p:bgPr>
         <a:blipFill dpi="0" rotWithShape="1">
-          <a:blip r:embed="rId1">
+          <a:blip r:embed="rId3">
             <a:lum/>
           </a:blip>
           <a:srcRect/>
@@ -4524,7 +7114,7 @@
     <p:bg>
       <p:bgPr>
         <a:blipFill dpi="0" rotWithShape="1">
-          <a:blip r:embed="rId1">
+          <a:blip r:embed="rId3">
             <a:lum/>
           </a:blip>
           <a:srcRect/>
@@ -4563,7 +7153,7 @@
     <p:bg>
       <p:bgPr>
         <a:blipFill dpi="0" rotWithShape="1">
-          <a:blip r:embed="rId1">
+          <a:blip r:embed="rId3">
             <a:lum/>
           </a:blip>
           <a:srcRect/>
@@ -4602,7 +7192,7 @@
     <p:bg>
       <p:bgPr>
         <a:blipFill dpi="0" rotWithShape="1">
-          <a:blip r:embed="rId1">
+          <a:blip r:embed="rId3">
             <a:lum/>
           </a:blip>
           <a:srcRect/>
@@ -4641,7 +7231,7 @@
     <p:bg>
       <p:bgPr>
         <a:blipFill dpi="0" rotWithShape="1">
-          <a:blip r:embed="rId1">
+          <a:blip r:embed="rId3">
             <a:lum/>
           </a:blip>
           <a:srcRect/>
@@ -4680,7 +7270,7 @@
     <p:bg>
       <p:bgPr>
         <a:blipFill dpi="0" rotWithShape="1">
-          <a:blip r:embed="rId1">
+          <a:blip r:embed="rId3">
             <a:lum/>
           </a:blip>
           <a:srcRect/>
@@ -4719,7 +7309,7 @@
     <p:bg>
       <p:bgPr>
         <a:blipFill dpi="0" rotWithShape="1">
-          <a:blip r:embed="rId1">
+          <a:blip r:embed="rId3">
             <a:lum/>
           </a:blip>
           <a:srcRect/>
@@ -4758,7 +7348,7 @@
     <p:bg>
       <p:bgPr>
         <a:blipFill dpi="0" rotWithShape="1">
-          <a:blip r:embed="rId1">
+          <a:blip r:embed="rId3">
             <a:lum/>
           </a:blip>
           <a:srcRect/>
@@ -4797,7 +7387,7 @@
     <p:bg>
       <p:bgPr>
         <a:blipFill dpi="0" rotWithShape="1">
-          <a:blip r:embed="rId1">
+          <a:blip r:embed="rId3">
             <a:lum/>
           </a:blip>
           <a:srcRect/>
@@ -4836,7 +7426,7 @@
     <p:bg>
       <p:bgPr>
         <a:blipFill dpi="0" rotWithShape="1">
-          <a:blip r:embed="rId1">
+          <a:blip r:embed="rId3">
             <a:lum/>
           </a:blip>
           <a:srcRect/>
@@ -4875,7 +7465,7 @@
     <p:bg>
       <p:bgPr>
         <a:blipFill dpi="0" rotWithShape="1">
-          <a:blip r:embed="rId1">
+          <a:blip r:embed="rId3">
             <a:lum/>
           </a:blip>
           <a:srcRect/>
@@ -4914,7 +7504,7 @@
     <p:bg>
       <p:bgPr>
         <a:blipFill dpi="0" rotWithShape="1">
-          <a:blip r:embed="rId1">
+          <a:blip r:embed="rId3">
             <a:lum/>
           </a:blip>
           <a:srcRect/>
@@ -4953,7 +7543,7 @@
     <p:bg>
       <p:bgPr>
         <a:blipFill dpi="0" rotWithShape="1">
-          <a:blip r:embed="rId1">
+          <a:blip r:embed="rId3">
             <a:lum/>
           </a:blip>
           <a:srcRect/>
@@ -5279,4 +7869,299 @@
     </a:ext>
   </a:extLst>
 </a:theme>
+</file>
+
+<file path=ppt/theme/theme2.xml><?xml version="1.0" encoding="utf-8"?>
+<a:theme xmlns:a="http://schemas.openxmlformats.org/drawingml/2006/main" name="Office Theme">
+  <a:themeElements>
+    <a:clrScheme name="Office">
+      <a:dk1>
+        <a:sysClr val="windowText" lastClr="000000"/>
+      </a:dk1>
+      <a:lt1>
+        <a:sysClr val="window" lastClr="FFFFFF"/>
+      </a:lt1>
+      <a:dk2>
+        <a:srgbClr val="44546A"/>
+      </a:dk2>
+      <a:lt2>
+        <a:srgbClr val="E7E6E6"/>
+      </a:lt2>
+      <a:accent1>
+        <a:srgbClr val="4472C4"/>
+      </a:accent1>
+      <a:accent2>
+        <a:srgbClr val="ED7D31"/>
+      </a:accent2>
+      <a:accent3>
+        <a:srgbClr val="A5A5A5"/>
+      </a:accent3>
+      <a:accent4>
+        <a:srgbClr val="FFC000"/>
+      </a:accent4>
+      <a:accent5>
+        <a:srgbClr val="5B9BD5"/>
+      </a:accent5>
+      <a:accent6>
+        <a:srgbClr val="70AD47"/>
+      </a:accent6>
+      <a:hlink>
+        <a:srgbClr val="0563C1"/>
+      </a:hlink>
+      <a:folHlink>
+        <a:srgbClr val="954F72"/>
+      </a:folHlink>
+    </a:clrScheme>
+    <a:fontScheme name="Office">
+      <a:majorFont>
+        <a:latin typeface="Calibri Light" panose="020F0302020204030204"/>
+        <a:ea typeface=""/>
+        <a:cs typeface=""/>
+        <a:font script="Jpan" typeface="游ゴシック Light"/>
+        <a:font script="Hang" typeface="맑은 고딕"/>
+        <a:font script="Hans" typeface="等线 Light"/>
+        <a:font script="Hant" typeface="新細明體"/>
+        <a:font script="Arab" typeface="Times New Roman"/>
+        <a:font script="Hebr" typeface="Times New Roman"/>
+        <a:font script="Thai" typeface="Angsana New"/>
+        <a:font script="Ethi" typeface="Nyala"/>
+        <a:font script="Beng" typeface="Vrinda"/>
+        <a:font script="Gujr" typeface="Shruti"/>
+        <a:font script="Khmr" typeface="MoolBoran"/>
+        <a:font script="Knda" typeface="Tunga"/>
+        <a:font script="Guru" typeface="Raavi"/>
+        <a:font script="Cans" typeface="Euphemia"/>
+        <a:font script="Cher" typeface="Plantagenet Cherokee"/>
+        <a:font script="Yiii" typeface="Microsoft Yi Baiti"/>
+        <a:font script="Tibt" typeface="Microsoft Himalaya"/>
+        <a:font script="Thaa" typeface="MV Boli"/>
+        <a:font script="Deva" typeface="Mangal"/>
+        <a:font script="Telu" typeface="Gautami"/>
+        <a:font script="Taml" typeface="Latha"/>
+        <a:font script="Syrc" typeface="Estrangelo Edessa"/>
+        <a:font script="Orya" typeface="Kalinga"/>
+        <a:font script="Mlym" typeface="Kartika"/>
+        <a:font script="Laoo" typeface="DokChampa"/>
+        <a:font script="Sinh" typeface="Iskoola Pota"/>
+        <a:font script="Mong" typeface="Mongolian Baiti"/>
+        <a:font script="Viet" typeface="Times New Roman"/>
+        <a:font script="Uigh" typeface="Microsoft Uighur"/>
+        <a:font script="Geor" typeface="Sylfaen"/>
+        <a:font script="Armn" typeface="Arial"/>
+        <a:font script="Bugi" typeface="Leelawadee UI"/>
+        <a:font script="Bopo" typeface="Microsoft JhengHei"/>
+        <a:font script="Java" typeface="Javanese Text"/>
+        <a:font script="Lisu" typeface="Segoe UI"/>
+        <a:font script="Mymr" typeface="Myanmar Text"/>
+        <a:font script="Nkoo" typeface="Ebrima"/>
+        <a:font script="Olck" typeface="Nirmala UI"/>
+        <a:font script="Osma" typeface="Ebrima"/>
+        <a:font script="Phag" typeface="Phagspa"/>
+        <a:font script="Syrn" typeface="Estrangelo Edessa"/>
+        <a:font script="Syrj" typeface="Estrangelo Edessa"/>
+        <a:font script="Syre" typeface="Estrangelo Edessa"/>
+        <a:font script="Sora" typeface="Nirmala UI"/>
+        <a:font script="Tale" typeface="Microsoft Tai Le"/>
+        <a:font script="Talu" typeface="Microsoft New Tai Lue"/>
+        <a:font script="Tfng" typeface="Ebrima"/>
+      </a:majorFont>
+      <a:minorFont>
+        <a:latin typeface="Calibri" panose="020F0502020204030204"/>
+        <a:ea typeface=""/>
+        <a:cs typeface=""/>
+        <a:font script="Jpan" typeface="游ゴシック"/>
+        <a:font script="Hang" typeface="맑은 고딕"/>
+        <a:font script="Hans" typeface="等线"/>
+        <a:font script="Hant" typeface="新細明體"/>
+        <a:font script="Arab" typeface="Arial"/>
+        <a:font script="Hebr" typeface="Arial"/>
+        <a:font script="Thai" typeface="Cordia New"/>
+        <a:font script="Ethi" typeface="Nyala"/>
+        <a:font script="Beng" typeface="Vrinda"/>
+        <a:font script="Gujr" typeface="Shruti"/>
+        <a:font script="Khmr" typeface="DaunPenh"/>
+        <a:font script="Knda" typeface="Tunga"/>
+        <a:font script="Guru" typeface="Raavi"/>
+        <a:font script="Cans" typeface="Euphemia"/>
+        <a:font script="Cher" typeface="Plantagenet Cherokee"/>
+        <a:font script="Yiii" typeface="Microsoft Yi Baiti"/>
+        <a:font script="Tibt" typeface="Microsoft Himalaya"/>
+        <a:font script="Thaa" typeface="MV Boli"/>
+        <a:font script="Deva" typeface="Mangal"/>
+        <a:font script="Telu" typeface="Gautami"/>
+        <a:font script="Taml" typeface="Latha"/>
+        <a:font script="Syrc" typeface="Estrangelo Edessa"/>
+        <a:font script="Orya" typeface="Kalinga"/>
+        <a:font script="Mlym" typeface="Kartika"/>
+        <a:font script="Laoo" typeface="DokChampa"/>
+        <a:font script="Sinh" typeface="Iskoola Pota"/>
+        <a:font script="Mong" typeface="Mongolian Baiti"/>
+        <a:font script="Viet" typeface="Arial"/>
+        <a:font script="Uigh" typeface="Microsoft Uighur"/>
+        <a:font script="Geor" typeface="Sylfaen"/>
+        <a:font script="Armn" typeface="Arial"/>
+        <a:font script="Bugi" typeface="Leelawadee UI"/>
+        <a:font script="Bopo" typeface="Microsoft JhengHei"/>
+        <a:font script="Java" typeface="Javanese Text"/>
+        <a:font script="Lisu" typeface="Segoe UI"/>
+        <a:font script="Mymr" typeface="Myanmar Text"/>
+        <a:font script="Nkoo" typeface="Ebrima"/>
+        <a:font script="Olck" typeface="Nirmala UI"/>
+        <a:font script="Osma" typeface="Ebrima"/>
+        <a:font script="Phag" typeface="Phagspa"/>
+        <a:font script="Syrn" typeface="Estrangelo Edessa"/>
+        <a:font script="Syrj" typeface="Estrangelo Edessa"/>
+        <a:font script="Syre" typeface="Estrangelo Edessa"/>
+        <a:font script="Sora" typeface="Nirmala UI"/>
+        <a:font script="Tale" typeface="Microsoft Tai Le"/>
+        <a:font script="Talu" typeface="Microsoft New Tai Lue"/>
+        <a:font script="Tfng" typeface="Ebrima"/>
+      </a:minorFont>
+    </a:fontScheme>
+    <a:fmtScheme name="Office">
+      <a:fillStyleLst>
+        <a:solidFill>
+          <a:schemeClr val="phClr"/>
+        </a:solidFill>
+        <a:gradFill rotWithShape="1">
+          <a:gsLst>
+            <a:gs pos="0">
+              <a:schemeClr val="phClr">
+                <a:lumMod val="110000"/>
+                <a:satMod val="105000"/>
+                <a:tint val="67000"/>
+              </a:schemeClr>
+            </a:gs>
+            <a:gs pos="50000">
+              <a:schemeClr val="phClr">
+                <a:lumMod val="105000"/>
+                <a:satMod val="103000"/>
+                <a:tint val="73000"/>
+              </a:schemeClr>
+            </a:gs>
+            <a:gs pos="100000">
+              <a:schemeClr val="phClr">
+                <a:lumMod val="105000"/>
+                <a:satMod val="109000"/>
+                <a:tint val="81000"/>
+              </a:schemeClr>
+            </a:gs>
+          </a:gsLst>
+          <a:lin ang="5400000" scaled="0"/>
+        </a:gradFill>
+        <a:gradFill rotWithShape="1">
+          <a:gsLst>
+            <a:gs pos="0">
+              <a:schemeClr val="phClr">
+                <a:satMod val="103000"/>
+                <a:lumMod val="102000"/>
+                <a:tint val="94000"/>
+              </a:schemeClr>
+            </a:gs>
+            <a:gs pos="50000">
+              <a:schemeClr val="phClr">
+                <a:satMod val="110000"/>
+                <a:lumMod val="100000"/>
+                <a:shade val="100000"/>
+              </a:schemeClr>
+            </a:gs>
+            <a:gs pos="100000">
+              <a:schemeClr val="phClr">
+                <a:lumMod val="99000"/>
+                <a:satMod val="120000"/>
+                <a:shade val="78000"/>
+              </a:schemeClr>
+            </a:gs>
+          </a:gsLst>
+          <a:lin ang="5400000" scaled="0"/>
+        </a:gradFill>
+      </a:fillStyleLst>
+      <a:lnStyleLst>
+        <a:ln w="6350" cap="flat" cmpd="sng" algn="ctr">
+          <a:solidFill>
+            <a:schemeClr val="phClr"/>
+          </a:solidFill>
+          <a:prstDash val="solid"/>
+          <a:miter lim="800000"/>
+        </a:ln>
+        <a:ln w="12700" cap="flat" cmpd="sng" algn="ctr">
+          <a:solidFill>
+            <a:schemeClr val="phClr"/>
+          </a:solidFill>
+          <a:prstDash val="solid"/>
+          <a:miter lim="800000"/>
+        </a:ln>
+        <a:ln w="19050" cap="flat" cmpd="sng" algn="ctr">
+          <a:solidFill>
+            <a:schemeClr val="phClr"/>
+          </a:solidFill>
+          <a:prstDash val="solid"/>
+          <a:miter lim="800000"/>
+        </a:ln>
+      </a:lnStyleLst>
+      <a:effectStyleLst>
+        <a:effectStyle>
+          <a:effectLst/>
+        </a:effectStyle>
+        <a:effectStyle>
+          <a:effectLst/>
+        </a:effectStyle>
+        <a:effectStyle>
+          <a:effectLst>
+            <a:outerShdw blurRad="57150" dist="19050" dir="5400000" algn="ctr" rotWithShape="0">
+              <a:srgbClr val="000000">
+                <a:alpha val="63000"/>
+              </a:srgbClr>
+            </a:outerShdw>
+          </a:effectLst>
+        </a:effectStyle>
+      </a:effectStyleLst>
+      <a:bgFillStyleLst>
+        <a:solidFill>
+          <a:schemeClr val="phClr"/>
+        </a:solidFill>
+        <a:solidFill>
+          <a:schemeClr val="phClr">
+            <a:tint val="95000"/>
+            <a:satMod val="170000"/>
+          </a:schemeClr>
+        </a:solidFill>
+        <a:gradFill rotWithShape="1">
+          <a:gsLst>
+            <a:gs pos="0">
+              <a:schemeClr val="phClr">
+                <a:tint val="93000"/>
+                <a:satMod val="150000"/>
+                <a:shade val="98000"/>
+                <a:lumMod val="102000"/>
+              </a:schemeClr>
+            </a:gs>
+            <a:gs pos="50000">
+              <a:schemeClr val="phClr">
+                <a:tint val="98000"/>
+                <a:satMod val="130000"/>
+                <a:shade val="90000"/>
+                <a:lumMod val="103000"/>
+              </a:schemeClr>
+            </a:gs>
+            <a:gs pos="100000">
+              <a:schemeClr val="phClr">
+                <a:shade val="63000"/>
+                <a:satMod val="120000"/>
+              </a:schemeClr>
+            </a:gs>
+          </a:gsLst>
+          <a:lin ang="5400000" scaled="0"/>
+        </a:gradFill>
+      </a:bgFillStyleLst>
+    </a:fmtScheme>
+  </a:themeElements>
+  <a:objectDefaults/>
+  <a:extraClrSchemeLst/>
+  <a:extLst>
+    <a:ext uri="{05A4C25C-085E-4340-85A3-A5531E510DB2}">
+      <thm15:themeFamily xmlns:thm15="http://schemas.microsoft.com/office/thememl/2012/main" name="Office Theme" id="{62F939B6-93AF-4DB8-9C6B-D6C7DFDC589F}" vid="{4A3C46E8-61CC-4603-A589-7422A47A8E4A}"/>
+    </a:ext>
+  </a:extLst>
+</a:theme>
 </file>
</xml_diff>